<commit_message>
Added automatic gui subscribe
</commit_message>
<xml_diff>
--- a/Gse/src/server/docs/final_design_process_2017.pptx
+++ b/Gse/src/server/docs/final_design_process_2017.pptx
@@ -7,10 +7,10 @@
     <p:sldMasterId id="2147483728" r:id="rId3"/>
   </p:sldMasterIdLst>
   <p:notesMasterIdLst>
-    <p:notesMasterId r:id="rId27"/>
+    <p:notesMasterId r:id="rId28"/>
   </p:notesMasterIdLst>
   <p:handoutMasterIdLst>
-    <p:handoutMasterId r:id="rId28"/>
+    <p:handoutMasterId r:id="rId29"/>
   </p:handoutMasterIdLst>
   <p:sldIdLst>
     <p:sldId id="464" r:id="rId4"/>
@@ -30,12 +30,13 @@
     <p:sldId id="499" r:id="rId18"/>
     <p:sldId id="500" r:id="rId19"/>
     <p:sldId id="501" r:id="rId20"/>
-    <p:sldId id="502" r:id="rId21"/>
-    <p:sldId id="503" r:id="rId22"/>
-    <p:sldId id="505" r:id="rId23"/>
-    <p:sldId id="512" r:id="rId24"/>
-    <p:sldId id="513" r:id="rId25"/>
-    <p:sldId id="476" r:id="rId26"/>
+    <p:sldId id="515" r:id="rId21"/>
+    <p:sldId id="502" r:id="rId22"/>
+    <p:sldId id="503" r:id="rId23"/>
+    <p:sldId id="505" r:id="rId24"/>
+    <p:sldId id="512" r:id="rId25"/>
+    <p:sldId id="513" r:id="rId26"/>
+    <p:sldId id="476" r:id="rId27"/>
   </p:sldIdLst>
   <p:sldSz cx="9144000" cy="6858000" type="screen4x3"/>
   <p:notesSz cx="6858000" cy="9144000"/>
@@ -245,7 +246,7 @@
                 <a:latin typeface="Arial"/>
               </a:rPr>
               <a:pPr/>
-              <a:t>9/7/17</a:t>
+              <a:t>9/8/17</a:t>
             </a:fld>
             <a:endParaRPr lang="en-US" dirty="0">
               <a:latin typeface="Arial"/>
@@ -425,7 +426,7 @@
             <a:fld id="{2CD6293C-6F3F-374D-A003-D3E152FC3744}" type="datetimeFigureOut">
               <a:rPr lang="en-US" smtClean="0"/>
               <a:pPr/>
-              <a:t>9/7/17</a:t>
+              <a:t>9/8/17</a:t>
             </a:fld>
             <a:endParaRPr lang="en-US" dirty="0"/>
           </a:p>
@@ -1278,7 +1279,7 @@
               <a:pPr>
                 <a:defRPr/>
               </a:pPr>
-              <a:t>21</a:t>
+              <a:t>22</a:t>
             </a:fld>
             <a:endParaRPr lang="en-US" dirty="0"/>
           </a:p>
@@ -1407,7 +1408,7 @@
               <a:pPr>
                 <a:defRPr/>
               </a:pPr>
-              <a:t>22</a:t>
+              <a:t>23</a:t>
             </a:fld>
             <a:endParaRPr lang="en-US" dirty="0"/>
           </a:p>
@@ -9197,11 +9198,6 @@
                 </a:rPr>
                 <a:t>D</a:t>
               </a:r>
-              <a:endParaRPr lang="en-US" sz="1400" dirty="0">
-                <a:solidFill>
-                  <a:schemeClr val="tx1"/>
-                </a:solidFill>
-              </a:endParaRPr>
             </a:p>
           </p:txBody>
         </p:sp>
@@ -9252,11 +9248,6 @@
                 </a:rPr>
                 <a:t>D</a:t>
               </a:r>
-              <a:endParaRPr lang="en-US" sz="1400" dirty="0">
-                <a:solidFill>
-                  <a:schemeClr val="tx1"/>
-                </a:solidFill>
-              </a:endParaRPr>
             </a:p>
           </p:txBody>
         </p:sp>
@@ -9368,11 +9359,6 @@
               </a:rPr>
               <a:t>D</a:t>
             </a:r>
-            <a:endParaRPr lang="en-US" sz="1400" dirty="0">
-              <a:solidFill>
-                <a:schemeClr val="tx1"/>
-              </a:solidFill>
-            </a:endParaRPr>
           </a:p>
         </p:txBody>
       </p:sp>
@@ -9428,11 +9414,6 @@
               </a:rPr>
               <a:t>D</a:t>
             </a:r>
-            <a:endParaRPr lang="en-US" sz="1400" dirty="0">
-              <a:solidFill>
-                <a:schemeClr val="tx1"/>
-              </a:solidFill>
-            </a:endParaRPr>
           </a:p>
         </p:txBody>
       </p:sp>
@@ -9488,11 +9469,6 @@
               </a:rPr>
               <a:t>D</a:t>
             </a:r>
-            <a:endParaRPr lang="en-US" sz="1400" dirty="0">
-              <a:solidFill>
-                <a:schemeClr val="tx1"/>
-              </a:solidFill>
-            </a:endParaRPr>
           </a:p>
         </p:txBody>
       </p:sp>
@@ -9548,11 +9524,6 @@
               </a:rPr>
               <a:t>D</a:t>
             </a:r>
-            <a:endParaRPr lang="en-US" sz="1400" dirty="0">
-              <a:solidFill>
-                <a:schemeClr val="tx1"/>
-              </a:solidFill>
-            </a:endParaRPr>
           </a:p>
         </p:txBody>
       </p:sp>
@@ -9733,11 +9704,6 @@
                 </a:rPr>
                 <a:t>D</a:t>
               </a:r>
-              <a:endParaRPr lang="en-US" sz="1400" dirty="0">
-                <a:solidFill>
-                  <a:schemeClr val="tx1"/>
-                </a:solidFill>
-              </a:endParaRPr>
             </a:p>
           </p:txBody>
         </p:sp>
@@ -9788,11 +9754,6 @@
                 </a:rPr>
                 <a:t>D</a:t>
               </a:r>
-              <a:endParaRPr lang="en-US" sz="1400" dirty="0">
-                <a:solidFill>
-                  <a:schemeClr val="tx1"/>
-                </a:solidFill>
-              </a:endParaRPr>
             </a:p>
           </p:txBody>
         </p:sp>
@@ -9958,7 +9919,6 @@
               <a:rPr lang="en-US" sz="1100" dirty="0" smtClean="0"/>
               <a:t>Arbitrary Protocol</a:t>
             </a:r>
-            <a:endParaRPr lang="en-US" sz="1100" dirty="0" smtClean="0"/>
           </a:p>
           <a:p>
             <a:endParaRPr lang="en-US" sz="1100" dirty="0" smtClean="0"/>
@@ -12153,11 +12113,6 @@
                 </a:rPr>
                 <a:t>D</a:t>
               </a:r>
-              <a:endParaRPr lang="en-US" sz="1400" dirty="0">
-                <a:solidFill>
-                  <a:schemeClr val="tx1"/>
-                </a:solidFill>
-              </a:endParaRPr>
             </a:p>
           </p:txBody>
         </p:sp>
@@ -12208,11 +12163,6 @@
                 </a:rPr>
                 <a:t>D</a:t>
               </a:r>
-              <a:endParaRPr lang="en-US" sz="1400" dirty="0">
-                <a:solidFill>
-                  <a:schemeClr val="tx1"/>
-                </a:solidFill>
-              </a:endParaRPr>
             </a:p>
           </p:txBody>
         </p:sp>
@@ -12324,11 +12274,6 @@
               </a:rPr>
               <a:t>D</a:t>
             </a:r>
-            <a:endParaRPr lang="en-US" sz="1400" dirty="0">
-              <a:solidFill>
-                <a:schemeClr val="tx1"/>
-              </a:solidFill>
-            </a:endParaRPr>
           </a:p>
         </p:txBody>
       </p:sp>
@@ -12384,11 +12329,6 @@
               </a:rPr>
               <a:t>D</a:t>
             </a:r>
-            <a:endParaRPr lang="en-US" sz="1400" dirty="0">
-              <a:solidFill>
-                <a:schemeClr val="tx1"/>
-              </a:solidFill>
-            </a:endParaRPr>
           </a:p>
         </p:txBody>
       </p:sp>
@@ -12444,11 +12384,6 @@
               </a:rPr>
               <a:t>D</a:t>
             </a:r>
-            <a:endParaRPr lang="en-US" sz="1400" dirty="0">
-              <a:solidFill>
-                <a:schemeClr val="tx1"/>
-              </a:solidFill>
-            </a:endParaRPr>
           </a:p>
         </p:txBody>
       </p:sp>
@@ -12504,11 +12439,6 @@
               </a:rPr>
               <a:t>D</a:t>
             </a:r>
-            <a:endParaRPr lang="en-US" sz="1400" dirty="0">
-              <a:solidFill>
-                <a:schemeClr val="tx1"/>
-              </a:solidFill>
-            </a:endParaRPr>
           </a:p>
         </p:txBody>
       </p:sp>
@@ -12689,11 +12619,6 @@
                 </a:rPr>
                 <a:t>D</a:t>
               </a:r>
-              <a:endParaRPr lang="en-US" sz="1400" dirty="0">
-                <a:solidFill>
-                  <a:schemeClr val="tx1"/>
-                </a:solidFill>
-              </a:endParaRPr>
             </a:p>
           </p:txBody>
         </p:sp>
@@ -12744,11 +12669,6 @@
                 </a:rPr>
                 <a:t>D</a:t>
               </a:r>
-              <a:endParaRPr lang="en-US" sz="1400" dirty="0">
-                <a:solidFill>
-                  <a:schemeClr val="tx1"/>
-                </a:solidFill>
-              </a:endParaRPr>
             </a:p>
           </p:txBody>
         </p:sp>
@@ -12914,7 +12834,6 @@
               <a:rPr lang="en-US" sz="1100" dirty="0" smtClean="0"/>
               <a:t>Arbitrary Protocol</a:t>
             </a:r>
-            <a:endParaRPr lang="en-US" sz="1100" dirty="0" smtClean="0"/>
           </a:p>
           <a:p>
             <a:endParaRPr lang="en-US" sz="1100" dirty="0" smtClean="0"/>
@@ -13321,14 +13240,6 @@
               </a:rPr>
               <a:t>Server Architecture</a:t>
             </a:r>
-            <a:r>
-              <a:rPr lang="en-US" sz="2000" dirty="0" smtClean="0">
-                <a:solidFill>
-                  <a:schemeClr val="tx1"/>
-                </a:solidFill>
-              </a:rPr>
-              <a:t/>
-            </a:r>
             <a:br>
               <a:rPr lang="en-US" sz="2000" dirty="0" smtClean="0">
                 <a:solidFill>
@@ -13342,15 +13253,7 @@
                   <a:schemeClr val="tx1"/>
                 </a:solidFill>
               </a:rPr>
-              <a:t>ZMQ </a:t>
-            </a:r>
-            <a:r>
-              <a:rPr lang="en-US" sz="1050" dirty="0" smtClean="0">
-                <a:solidFill>
-                  <a:schemeClr val="tx1"/>
-                </a:solidFill>
-              </a:rPr>
-              <a:t>Kernel</a:t>
+              <a:t>ZMQ Kernel</a:t>
             </a:r>
             <a:endParaRPr lang="en-US" sz="2000" dirty="0">
               <a:solidFill>
@@ -14281,11 +14184,7 @@
           <a:p>
             <a:r>
               <a:rPr lang="en-US" sz="800" dirty="0" smtClean="0"/>
-              <a:t>Configurable </a:t>
-            </a:r>
-            <a:r>
-              <a:rPr lang="en-US" sz="800" dirty="0" smtClean="0"/>
-              <a:t>routing through subscription and subscription commands. </a:t>
+              <a:t>Configurable routing through subscription and subscription commands. </a:t>
             </a:r>
             <a:endParaRPr lang="en-US" sz="800" dirty="0"/>
           </a:p>
@@ -14474,11 +14373,7 @@
             </a:r>
             <a:r>
               <a:rPr lang="en-US" sz="800" dirty="0" smtClean="0"/>
-              <a:t> and creates a new </a:t>
-            </a:r>
-            <a:r>
-              <a:rPr lang="en-US" sz="800" dirty="0" smtClean="0"/>
-              <a:t>Publisher thread</a:t>
+              <a:t> and creates a new Publisher thread</a:t>
             </a:r>
             <a:endParaRPr lang="en-US" sz="800" dirty="0"/>
           </a:p>
@@ -14708,11 +14603,7 @@
           <a:p>
             <a:r>
               <a:rPr lang="en-US" sz="800" dirty="0" smtClean="0"/>
-              <a:t>Routing Table Command </a:t>
-            </a:r>
-            <a:r>
-              <a:rPr lang="en-US" sz="800" dirty="0" smtClean="0"/>
-              <a:t>Socket tells publisher threads who to receive messages from</a:t>
+              <a:t>Routing Table Command Socket tells publisher threads who to receive messages from</a:t>
             </a:r>
             <a:endParaRPr lang="en-US" sz="800" dirty="0"/>
           </a:p>
@@ -15200,23 +15091,7 @@
                     <a:schemeClr val="tx1"/>
                   </a:solidFill>
                 </a:rPr>
-                <a:t>Ground</a:t>
-              </a:r>
-              <a:r>
-                <a:rPr lang="en-US" sz="800" dirty="0" smtClean="0">
-                  <a:solidFill>
-                    <a:schemeClr val="tx1"/>
-                  </a:solidFill>
-                </a:rPr>
-                <a:t>-Client Publisher </a:t>
-              </a:r>
-              <a:r>
-                <a:rPr lang="en-US" sz="800" dirty="0" smtClean="0">
-                  <a:solidFill>
-                    <a:schemeClr val="tx1"/>
-                  </a:solidFill>
-                </a:rPr>
-                <a:t>Thread</a:t>
+                <a:t>Ground-Client Publisher Thread</a:t>
               </a:r>
               <a:endParaRPr lang="en-US" sz="800" dirty="0">
                 <a:solidFill>
@@ -15365,15 +15240,7 @@
           <a:p>
             <a:r>
               <a:rPr lang="en-US" sz="800" dirty="0" smtClean="0"/>
-              <a:t>1 </a:t>
-            </a:r>
-            <a:r>
-              <a:rPr lang="en-US" sz="800" dirty="0" smtClean="0"/>
-              <a:t>flight subscriber </a:t>
-            </a:r>
-            <a:r>
-              <a:rPr lang="en-US" sz="800" dirty="0" smtClean="0"/>
-              <a:t>thread</a:t>
+              <a:t>1 flight subscriber thread</a:t>
             </a:r>
             <a:endParaRPr lang="en-US" sz="800" dirty="0"/>
           </a:p>
@@ -15483,23 +15350,7 @@
                     <a:schemeClr val="tx1"/>
                   </a:solidFill>
                 </a:rPr>
-                <a:t>Ground</a:t>
-              </a:r>
-              <a:r>
-                <a:rPr lang="en-US" sz="800" dirty="0" smtClean="0">
-                  <a:solidFill>
-                    <a:schemeClr val="tx1"/>
-                  </a:solidFill>
-                </a:rPr>
-                <a:t>-Client Publisher </a:t>
-              </a:r>
-              <a:r>
-                <a:rPr lang="en-US" sz="800" dirty="0" smtClean="0">
-                  <a:solidFill>
-                    <a:schemeClr val="tx1"/>
-                  </a:solidFill>
-                </a:rPr>
-                <a:t>Thread</a:t>
+                <a:t>Ground-Client Publisher Thread</a:t>
               </a:r>
               <a:endParaRPr lang="en-US" sz="800" dirty="0">
                 <a:solidFill>
@@ -15688,23 +15539,7 @@
                     <a:schemeClr val="tx1"/>
                   </a:solidFill>
                 </a:rPr>
-                <a:t>Ground</a:t>
-              </a:r>
-              <a:r>
-                <a:rPr lang="en-US" sz="800" dirty="0" smtClean="0">
-                  <a:solidFill>
-                    <a:schemeClr val="tx1"/>
-                  </a:solidFill>
-                </a:rPr>
-                <a:t>-Client Publisher </a:t>
-              </a:r>
-              <a:r>
-                <a:rPr lang="en-US" sz="800" dirty="0" smtClean="0">
-                  <a:solidFill>
-                    <a:schemeClr val="tx1"/>
-                  </a:solidFill>
-                </a:rPr>
-                <a:t>Thread</a:t>
+                <a:t>Ground-Client Publisher Thread</a:t>
               </a:r>
               <a:endParaRPr lang="en-US" sz="800" dirty="0">
                 <a:solidFill>
@@ -16114,23 +15949,7 @@
                     <a:schemeClr val="tx1"/>
                   </a:solidFill>
                 </a:rPr>
-                <a:t>Ground</a:t>
-              </a:r>
-              <a:r>
-                <a:rPr lang="en-US" sz="800" dirty="0" smtClean="0">
-                  <a:solidFill>
-                    <a:schemeClr val="tx1"/>
-                  </a:solidFill>
-                </a:rPr>
-                <a:t>-Client </a:t>
-              </a:r>
-              <a:r>
-                <a:rPr lang="en-US" sz="800" dirty="0" smtClean="0">
-                  <a:solidFill>
-                    <a:schemeClr val="tx1"/>
-                  </a:solidFill>
-                </a:rPr>
-                <a:t>Subscriber Thread</a:t>
+                <a:t>Ground-Client Subscriber Thread</a:t>
               </a:r>
               <a:endParaRPr lang="en-US" sz="800" dirty="0">
                 <a:solidFill>
@@ -16394,15 +16213,7 @@
                     <a:schemeClr val="tx1"/>
                   </a:solidFill>
                 </a:rPr>
-                <a:t>Flight-Client Publisher </a:t>
-              </a:r>
-              <a:r>
-                <a:rPr lang="en-US" sz="800" dirty="0" smtClean="0">
-                  <a:solidFill>
-                    <a:schemeClr val="tx1"/>
-                  </a:solidFill>
-                </a:rPr>
-                <a:t>Thread</a:t>
+                <a:t>Flight-Client Publisher Thread</a:t>
               </a:r>
               <a:endParaRPr lang="en-US" sz="800" dirty="0">
                 <a:solidFill>
@@ -16591,15 +16402,7 @@
                     <a:schemeClr val="tx1"/>
                   </a:solidFill>
                 </a:rPr>
-                <a:t>Flight-Client Publisher </a:t>
-              </a:r>
-              <a:r>
-                <a:rPr lang="en-US" sz="800" dirty="0" smtClean="0">
-                  <a:solidFill>
-                    <a:schemeClr val="tx1"/>
-                  </a:solidFill>
-                </a:rPr>
-                <a:t>Thread</a:t>
+                <a:t>Flight-Client Publisher Thread</a:t>
               </a:r>
               <a:endParaRPr lang="en-US" sz="800" dirty="0">
                 <a:solidFill>
@@ -16788,15 +16591,7 @@
                     <a:schemeClr val="tx1"/>
                   </a:solidFill>
                 </a:rPr>
-                <a:t>Flight-Client Publisher </a:t>
-              </a:r>
-              <a:r>
-                <a:rPr lang="en-US" sz="800" dirty="0" smtClean="0">
-                  <a:solidFill>
-                    <a:schemeClr val="tx1"/>
-                  </a:solidFill>
-                </a:rPr>
-                <a:t>Thread</a:t>
+                <a:t>Flight-Client Publisher Thread</a:t>
               </a:r>
               <a:endParaRPr lang="en-US" sz="800" dirty="0">
                 <a:solidFill>
@@ -16945,19 +16740,7 @@
           <a:p>
             <a:r>
               <a:rPr lang="en-US" sz="800" dirty="0" smtClean="0"/>
-              <a:t>1 </a:t>
-            </a:r>
-            <a:r>
-              <a:rPr lang="en-US" sz="800" dirty="0" smtClean="0"/>
-              <a:t>ground</a:t>
-            </a:r>
-            <a:r>
-              <a:rPr lang="en-US" sz="800" dirty="0" smtClean="0"/>
-              <a:t> subscriber </a:t>
-            </a:r>
-            <a:r>
-              <a:rPr lang="en-US" sz="800" dirty="0" smtClean="0"/>
-              <a:t>thread</a:t>
+              <a:t>1 ground subscriber thread</a:t>
             </a:r>
             <a:endParaRPr lang="en-US" sz="800" dirty="0"/>
           </a:p>
@@ -18524,7 +18307,6 @@
               <a:rPr lang="en-US" sz="2000" dirty="0" smtClean="0"/>
               <a:t>Tests for packet loss</a:t>
             </a:r>
-            <a:endParaRPr lang="en-US" sz="2000" dirty="0" smtClean="0"/>
           </a:p>
           <a:p>
             <a:r>
@@ -18536,15 +18318,7 @@
             <a:pPr lvl="1"/>
             <a:r>
               <a:rPr lang="en-US" sz="2000" dirty="0" smtClean="0"/>
-              <a:t>Monitor and record throughput given </a:t>
-            </a:r>
-            <a:r>
-              <a:rPr lang="en-US" sz="2000" dirty="0" smtClean="0"/>
-              <a:t>variable </a:t>
-            </a:r>
-            <a:r>
-              <a:rPr lang="en-US" sz="2000" dirty="0" smtClean="0"/>
-              <a:t>Publish Subscribe configurations and variable packet sizes</a:t>
+              <a:t>Monitor and record throughput given variable Publish Subscribe configurations and variable packet sizes</a:t>
             </a:r>
             <a:br>
               <a:rPr lang="en-US" sz="2000" dirty="0" smtClean="0"/>
@@ -18560,7 +18334,6 @@
               <a:rPr lang="en-US" sz="2000" dirty="0" smtClean="0"/>
               <a:t>&gt;2 MB/s*</a:t>
             </a:r>
-            <a:endParaRPr lang="en-US" sz="2000" dirty="0" smtClean="0"/>
           </a:p>
         </p:txBody>
       </p:sp>
@@ -19209,11 +18982,7 @@
           <a:p>
             <a:r>
               <a:rPr lang="en-US" sz="2000" dirty="0" smtClean="0"/>
-              <a:t>Zmq </a:t>
-            </a:r>
-            <a:r>
-              <a:rPr lang="en-US" sz="2000" dirty="0" smtClean="0"/>
-              <a:t>Radio Component shall attempt reconnection with the server if disconnected</a:t>
+              <a:t>Zmq Radio Component shall attempt reconnection with the server if disconnected</a:t>
             </a:r>
           </a:p>
           <a:p>
@@ -20531,7 +20300,7 @@
       </p:sp>
       <p:pic>
         <p:nvPicPr>
-          <p:cNvPr id="8" name="Picture 7"/>
+          <p:cNvPr id="14" name="Picture 13"/>
           <p:cNvPicPr>
             <a:picLocks noChangeAspect="1"/>
           </p:cNvPicPr>
@@ -20551,8 +20320,8 @@
         </p:blipFill>
         <p:spPr>
           <a:xfrm>
-            <a:off x="2774394" y="2071099"/>
-            <a:ext cx="6212144" cy="4358941"/>
+            <a:off x="2641389" y="2154139"/>
+            <a:ext cx="6502611" cy="3868398"/>
           </a:xfrm>
           <a:prstGeom prst="rect">
             <a:avLst/>
@@ -20598,80 +20367,6 @@
       </p:grpSpPr>
       <p:sp>
         <p:nvSpPr>
-          <p:cNvPr id="38" name="Rectangle 37"/>
-          <p:cNvSpPr/>
-          <p:nvPr/>
-        </p:nvSpPr>
-        <p:spPr>
-          <a:xfrm>
-            <a:off x="301611" y="4419365"/>
-            <a:ext cx="2173045" cy="890736"/>
-          </a:xfrm>
-          <a:prstGeom prst="rect">
-            <a:avLst/>
-          </a:prstGeom>
-          <a:solidFill>
-            <a:srgbClr val="00B050"/>
-          </a:solidFill>
-          <a:ln>
-            <a:noFill/>
-          </a:ln>
-          <a:effectLst>
-            <a:glow rad="101600">
-              <a:srgbClr val="00B050">
-                <a:alpha val="40000"/>
-              </a:srgbClr>
-            </a:glow>
-          </a:effectLst>
-        </p:spPr>
-        <p:style>
-          <a:lnRef idx="1">
-            <a:schemeClr val="accent1"/>
-          </a:lnRef>
-          <a:fillRef idx="3">
-            <a:schemeClr val="accent1"/>
-          </a:fillRef>
-          <a:effectRef idx="2">
-            <a:schemeClr val="accent1"/>
-          </a:effectRef>
-          <a:fontRef idx="minor">
-            <a:schemeClr val="lt1"/>
-          </a:fontRef>
-        </p:style>
-        <p:txBody>
-          <a:bodyPr rtlCol="0" anchor="ctr"/>
-          <a:lstStyle/>
-          <a:p>
-            <a:pPr algn="ctr"/>
-            <a:endParaRPr lang="en-US"/>
-          </a:p>
-        </p:txBody>
-      </p:sp>
-      <p:sp>
-        <p:nvSpPr>
-          <p:cNvPr id="2" name="Text Placeholder 1"/>
-          <p:cNvSpPr>
-            <a:spLocks noGrp="1"/>
-          </p:cNvSpPr>
-          <p:nvPr>
-            <p:ph type="body" sz="quarter" idx="16"/>
-          </p:nvPr>
-        </p:nvSpPr>
-        <p:spPr/>
-        <p:txBody>
-          <a:bodyPr/>
-          <a:lstStyle/>
-          <a:p>
-            <a:r>
-              <a:rPr lang="en-US" dirty="0" smtClean="0"/>
-              <a:t>Zmq Radio Component Implementation</a:t>
-            </a:r>
-            <a:endParaRPr lang="en-US" dirty="0"/>
-          </a:p>
-        </p:txBody>
-      </p:sp>
-      <p:sp>
-        <p:nvSpPr>
           <p:cNvPr id="3" name="Title 2"/>
           <p:cNvSpPr>
             <a:spLocks noGrp="1"/>
@@ -20680,16 +20375,29 @@
             <p:ph type="ctrTitle"/>
           </p:nvPr>
         </p:nvSpPr>
-        <p:spPr/>
+        <p:spPr>
+          <a:xfrm>
+            <a:off x="98658" y="11532"/>
+            <a:ext cx="5080082" cy="436031"/>
+          </a:xfrm>
+        </p:spPr>
         <p:txBody>
           <a:bodyPr/>
           <a:lstStyle/>
           <a:p>
             <a:r>
-              <a:rPr lang="en-US" dirty="0" smtClean="0"/>
-              <a:t>Design Process</a:t>
-            </a:r>
-            <a:endParaRPr lang="en-US" dirty="0"/>
+              <a:rPr lang="en-US" sz="1800" dirty="0" smtClean="0">
+                <a:solidFill>
+                  <a:schemeClr val="tx1"/>
+                </a:solidFill>
+              </a:rPr>
+              <a:t>Zmq-radio Sequence Diagram</a:t>
+            </a:r>
+            <a:endParaRPr lang="en-US" sz="1800" dirty="0">
+              <a:solidFill>
+                <a:schemeClr val="tx1"/>
+              </a:solidFill>
+            </a:endParaRPr>
           </a:p>
         </p:txBody>
       </p:sp>
@@ -20703,35 +20411,24 @@
             <p:ph type="dt" sz="half" idx="18"/>
           </p:nvPr>
         </p:nvSpPr>
-        <p:spPr/>
+        <p:spPr>
+          <a:xfrm>
+            <a:off x="449264" y="6492875"/>
+            <a:ext cx="1376363" cy="365125"/>
+          </a:xfrm>
+        </p:spPr>
         <p:txBody>
           <a:bodyPr/>
           <a:lstStyle/>
           <a:p>
             <a:r>
-              <a:rPr lang="en-US" dirty="0" smtClean="0"/>
-              <a:t>9/1/17</a:t>
-            </a:r>
-            <a:endParaRPr lang="en-US" dirty="0"/>
-          </a:p>
-        </p:txBody>
-      </p:sp>
-      <p:sp>
-        <p:nvSpPr>
-          <p:cNvPr id="6" name="Footer Placeholder 5"/>
-          <p:cNvSpPr>
-            <a:spLocks noGrp="1"/>
-          </p:cNvSpPr>
-          <p:nvPr>
-            <p:ph type="ftr" sz="quarter" idx="19"/>
-          </p:nvPr>
-        </p:nvSpPr>
-        <p:spPr/>
-        <p:txBody>
-          <a:bodyPr/>
-          <a:lstStyle/>
-          <a:p>
-            <a:endParaRPr lang="en-US" dirty="0"/>
+              <a:rPr lang="en-US" dirty="0" smtClean="0">
+                <a:solidFill>
+                  <a:schemeClr val="tx1"/>
+                </a:solidFill>
+              </a:rPr>
+              <a:t>9/8/17</a:t>
+            </a:r>
           </a:p>
         </p:txBody>
       </p:sp>
@@ -20745,36 +20442,52 @@
             <p:ph type="sldNum" sz="quarter" idx="20"/>
           </p:nvPr>
         </p:nvSpPr>
-        <p:spPr/>
+        <p:spPr>
+          <a:xfrm>
+            <a:off x="7021798" y="6518920"/>
+            <a:ext cx="2057400" cy="365125"/>
+          </a:xfrm>
+        </p:spPr>
         <p:txBody>
           <a:bodyPr/>
           <a:lstStyle/>
           <a:p>
             <a:fld id="{F1E51A9F-9D40-144B-9666-6B30B75E8C1B}" type="slidenum">
-              <a:rPr lang="en-US" smtClean="0"/>
+              <a:rPr lang="en-US" smtClean="0">
+                <a:solidFill>
+                  <a:schemeClr val="tx1"/>
+                </a:solidFill>
+              </a:rPr>
               <a:pPr/>
               <a:t>18</a:t>
             </a:fld>
-            <a:endParaRPr lang="en-US"/>
-          </a:p>
-        </p:txBody>
-      </p:sp>
-      <p:sp>
-        <p:nvSpPr>
-          <p:cNvPr id="9" name="Rectangle 8"/>
+            <a:endParaRPr lang="en-US">
+              <a:solidFill>
+                <a:schemeClr val="tx1"/>
+              </a:solidFill>
+            </a:endParaRPr>
+          </a:p>
+        </p:txBody>
+      </p:sp>
+      <p:sp>
+        <p:nvSpPr>
+          <p:cNvPr id="8" name="Rectangle 7"/>
           <p:cNvSpPr/>
           <p:nvPr/>
         </p:nvSpPr>
         <p:spPr>
           <a:xfrm>
-            <a:off x="474135" y="1722092"/>
-            <a:ext cx="1828001" cy="547768"/>
+            <a:off x="798927" y="1264026"/>
+            <a:ext cx="1600200" cy="188259"/>
           </a:xfrm>
           <a:prstGeom prst="rect">
             <a:avLst/>
           </a:prstGeom>
           <a:solidFill>
-            <a:srgbClr val="BA0C2F"/>
+            <a:schemeClr val="accent1">
+              <a:lumMod val="60000"/>
+              <a:lumOff val="40000"/>
+            </a:schemeClr>
           </a:solidFill>
           <a:ln>
             <a:noFill/>
@@ -20801,229 +20514,38 @@
           <a:p>
             <a:pPr algn="ctr"/>
             <a:r>
-              <a:rPr lang="en-US" dirty="0" smtClean="0"/>
-              <a:t>Requirements</a:t>
-            </a:r>
-            <a:endParaRPr lang="en-US" dirty="0"/>
-          </a:p>
-        </p:txBody>
-      </p:sp>
-      <p:sp>
-        <p:nvSpPr>
-          <p:cNvPr id="10" name="Rectangle 9"/>
-          <p:cNvSpPr/>
-          <p:nvPr/>
-        </p:nvSpPr>
-        <p:spPr>
-          <a:xfrm>
-            <a:off x="474134" y="2631331"/>
-            <a:ext cx="1828001" cy="547768"/>
-          </a:xfrm>
-          <a:prstGeom prst="rect">
-            <a:avLst/>
-          </a:prstGeom>
-          <a:solidFill>
-            <a:srgbClr val="BA0C2F"/>
-          </a:solidFill>
-          <a:ln>
-            <a:noFill/>
-          </a:ln>
-          <a:effectLst/>
-        </p:spPr>
-        <p:style>
-          <a:lnRef idx="1">
-            <a:schemeClr val="accent1"/>
-          </a:lnRef>
-          <a:fillRef idx="3">
-            <a:schemeClr val="accent1"/>
-          </a:fillRef>
-          <a:effectRef idx="2">
-            <a:schemeClr val="accent1"/>
-          </a:effectRef>
-          <a:fontRef idx="minor">
-            <a:schemeClr val="lt1"/>
-          </a:fontRef>
-        </p:style>
-        <p:txBody>
-          <a:bodyPr rtlCol="0" anchor="ctr"/>
-          <a:lstStyle/>
-          <a:p>
-            <a:pPr algn="ctr"/>
-            <a:r>
-              <a:rPr lang="en-US" smtClean="0"/>
-              <a:t>Analysis</a:t>
-            </a:r>
-            <a:endParaRPr lang="en-US" dirty="0"/>
-          </a:p>
-        </p:txBody>
-      </p:sp>
-      <p:sp>
-        <p:nvSpPr>
-          <p:cNvPr id="11" name="Rectangle 10"/>
-          <p:cNvSpPr/>
-          <p:nvPr/>
-        </p:nvSpPr>
-        <p:spPr>
-          <a:xfrm>
-            <a:off x="474134" y="3540570"/>
-            <a:ext cx="1828001" cy="547768"/>
-          </a:xfrm>
-          <a:prstGeom prst="rect">
-            <a:avLst/>
-          </a:prstGeom>
-          <a:solidFill>
-            <a:srgbClr val="BA0C2F"/>
-          </a:solidFill>
-          <a:ln>
-            <a:noFill/>
-          </a:ln>
-          <a:effectLst/>
-        </p:spPr>
-        <p:style>
-          <a:lnRef idx="1">
-            <a:schemeClr val="accent1"/>
-          </a:lnRef>
-          <a:fillRef idx="3">
-            <a:schemeClr val="accent1"/>
-          </a:fillRef>
-          <a:effectRef idx="2">
-            <a:schemeClr val="accent1"/>
-          </a:effectRef>
-          <a:fontRef idx="minor">
-            <a:schemeClr val="lt1"/>
-          </a:fontRef>
-        </p:style>
-        <p:txBody>
-          <a:bodyPr rtlCol="0" anchor="ctr"/>
-          <a:lstStyle/>
-          <a:p>
-            <a:pPr algn="ctr"/>
-            <a:r>
-              <a:rPr lang="en-US" dirty="0" smtClean="0"/>
-              <a:t>Design</a:t>
-            </a:r>
-            <a:endParaRPr lang="en-US" dirty="0"/>
-          </a:p>
-        </p:txBody>
-      </p:sp>
-      <p:sp>
-        <p:nvSpPr>
-          <p:cNvPr id="12" name="Rectangle 11"/>
-          <p:cNvSpPr/>
-          <p:nvPr/>
-        </p:nvSpPr>
-        <p:spPr>
-          <a:xfrm>
-            <a:off x="474134" y="4590849"/>
-            <a:ext cx="1828001" cy="547768"/>
-          </a:xfrm>
-          <a:prstGeom prst="rect">
-            <a:avLst/>
-          </a:prstGeom>
-          <a:solidFill>
-            <a:srgbClr val="BA0C2F"/>
-          </a:solidFill>
-          <a:ln>
-            <a:noFill/>
-          </a:ln>
-          <a:effectLst/>
-        </p:spPr>
-        <p:style>
-          <a:lnRef idx="1">
-            <a:schemeClr val="accent1"/>
-          </a:lnRef>
-          <a:fillRef idx="3">
-            <a:schemeClr val="accent1"/>
-          </a:fillRef>
-          <a:effectRef idx="2">
-            <a:schemeClr val="accent1"/>
-          </a:effectRef>
-          <a:fontRef idx="minor">
-            <a:schemeClr val="lt1"/>
-          </a:fontRef>
-        </p:style>
-        <p:txBody>
-          <a:bodyPr rtlCol="0" anchor="ctr"/>
-          <a:lstStyle/>
-          <a:p>
-            <a:pPr algn="ctr"/>
-            <a:r>
-              <a:rPr lang="en-US" smtClean="0"/>
-              <a:t>Implementation</a:t>
-            </a:r>
-            <a:endParaRPr lang="en-US" dirty="0"/>
-          </a:p>
-        </p:txBody>
-      </p:sp>
-      <p:sp>
-        <p:nvSpPr>
-          <p:cNvPr id="13" name="Rectangle 12"/>
-          <p:cNvSpPr/>
-          <p:nvPr/>
-        </p:nvSpPr>
-        <p:spPr>
-          <a:xfrm>
-            <a:off x="474134" y="5590036"/>
-            <a:ext cx="1828001" cy="547768"/>
-          </a:xfrm>
-          <a:prstGeom prst="rect">
-            <a:avLst/>
-          </a:prstGeom>
-          <a:solidFill>
-            <a:srgbClr val="BA0C2F"/>
-          </a:solidFill>
-          <a:ln>
-            <a:noFill/>
-          </a:ln>
-          <a:effectLst/>
-        </p:spPr>
-        <p:style>
-          <a:lnRef idx="1">
-            <a:schemeClr val="accent1"/>
-          </a:lnRef>
-          <a:fillRef idx="3">
-            <a:schemeClr val="accent1"/>
-          </a:fillRef>
-          <a:effectRef idx="2">
-            <a:schemeClr val="accent1"/>
-          </a:effectRef>
-          <a:fontRef idx="minor">
-            <a:schemeClr val="lt1"/>
-          </a:fontRef>
-        </p:style>
-        <p:txBody>
-          <a:bodyPr rtlCol="0" anchor="ctr"/>
-          <a:lstStyle/>
-          <a:p>
-            <a:pPr algn="ctr"/>
-            <a:r>
-              <a:rPr lang="en-US" dirty="0" smtClean="0"/>
-              <a:t>Test</a:t>
-            </a:r>
-            <a:endParaRPr lang="en-US" dirty="0"/>
+              <a:rPr lang="en-US" sz="1000" dirty="0" smtClean="0">
+                <a:solidFill>
+                  <a:schemeClr val="tx1"/>
+                </a:solidFill>
+              </a:rPr>
+              <a:t>Main Component Thread</a:t>
+            </a:r>
+            <a:endParaRPr lang="en-US" sz="1000" dirty="0">
+              <a:solidFill>
+                <a:schemeClr val="tx1"/>
+              </a:solidFill>
+            </a:endParaRPr>
           </a:p>
         </p:txBody>
       </p:sp>
       <p:cxnSp>
         <p:nvCxnSpPr>
-          <p:cNvPr id="17" name="Straight Arrow Connector 16"/>
-          <p:cNvCxnSpPr>
-            <a:stCxn id="9" idx="2"/>
-            <a:endCxn id="10" idx="0"/>
-          </p:cNvCxnSpPr>
+          <p:cNvPr id="10" name="Straight Arrow Connector 9"/>
+          <p:cNvCxnSpPr/>
           <p:nvPr/>
         </p:nvCxnSpPr>
         <p:spPr>
-          <a:xfrm flipH="1">
-            <a:off x="1388135" y="2269860"/>
-            <a:ext cx="1" cy="361471"/>
+          <a:xfrm>
+            <a:off x="169969" y="2050012"/>
+            <a:ext cx="1274902" cy="85785"/>
           </a:xfrm>
           <a:prstGeom prst="straightConnector1">
             <a:avLst/>
           </a:prstGeom>
           <a:ln w="12700" cap="flat" cmpd="sng" algn="ctr">
             <a:solidFill>
-              <a:schemeClr val="tx1"/>
+              <a:srgbClr val="FF0000"/>
             </a:solidFill>
             <a:prstDash val="solid"/>
             <a:round/>
@@ -21049,24 +20571,227 @@
       </p:cxnSp>
       <p:cxnSp>
         <p:nvCxnSpPr>
-          <p:cNvPr id="19" name="Straight Arrow Connector 18"/>
+          <p:cNvPr id="11" name="Straight Arrow Connector 10"/>
           <p:cNvCxnSpPr>
-            <a:stCxn id="10" idx="2"/>
-            <a:endCxn id="11" idx="0"/>
+            <a:stCxn id="8" idx="2"/>
           </p:cNvCxnSpPr>
           <p:nvPr/>
         </p:nvCxnSpPr>
         <p:spPr>
           <a:xfrm>
-            <a:off x="1388135" y="3179099"/>
-            <a:ext cx="0" cy="361471"/>
+            <a:off x="1599027" y="1452285"/>
+            <a:ext cx="0" cy="4940564"/>
           </a:xfrm>
           <a:prstGeom prst="straightConnector1">
             <a:avLst/>
           </a:prstGeom>
           <a:ln w="12700" cap="flat" cmpd="sng" algn="ctr">
             <a:solidFill>
-              <a:schemeClr val="tx1"/>
+              <a:schemeClr val="bg1">
+                <a:lumMod val="75000"/>
+              </a:schemeClr>
+            </a:solidFill>
+            <a:prstDash val="solid"/>
+            <a:round/>
+            <a:headEnd type="none" w="med" len="med"/>
+            <a:tailEnd type="triangle"/>
+          </a:ln>
+          <a:effectLst/>
+        </p:spPr>
+        <p:style>
+          <a:lnRef idx="2">
+            <a:schemeClr val="accent1"/>
+          </a:lnRef>
+          <a:fillRef idx="0">
+            <a:schemeClr val="accent1"/>
+          </a:fillRef>
+          <a:effectRef idx="1">
+            <a:schemeClr val="accent1"/>
+          </a:effectRef>
+          <a:fontRef idx="minor">
+            <a:schemeClr val="tx1"/>
+          </a:fontRef>
+        </p:style>
+      </p:cxnSp>
+      <p:sp>
+        <p:nvSpPr>
+          <p:cNvPr id="17" name="TextBox 16"/>
+          <p:cNvSpPr txBox="1"/>
+          <p:nvPr/>
+        </p:nvSpPr>
+        <p:spPr>
+          <a:xfrm>
+            <a:off x="79496" y="1773013"/>
+            <a:ext cx="841064" cy="276999"/>
+          </a:xfrm>
+          <a:prstGeom prst="rect">
+            <a:avLst/>
+          </a:prstGeom>
+          <a:noFill/>
+        </p:spPr>
+        <p:txBody>
+          <a:bodyPr wrap="none" rtlCol="0">
+            <a:spAutoFit/>
+          </a:bodyPr>
+          <a:lstStyle/>
+          <a:p>
+            <a:r>
+              <a:rPr lang="en-US" sz="1200" dirty="0" smtClean="0"/>
+              <a:t>ZMQ Error</a:t>
+            </a:r>
+            <a:endParaRPr lang="en-US" dirty="0"/>
+          </a:p>
+        </p:txBody>
+      </p:sp>
+      <p:sp>
+        <p:nvSpPr>
+          <p:cNvPr id="37" name="Rectangle 36"/>
+          <p:cNvSpPr/>
+          <p:nvPr/>
+        </p:nvSpPr>
+        <p:spPr>
+          <a:xfrm>
+            <a:off x="3075046" y="1270460"/>
+            <a:ext cx="1494845" cy="194693"/>
+          </a:xfrm>
+          <a:prstGeom prst="rect">
+            <a:avLst/>
+          </a:prstGeom>
+          <a:solidFill>
+            <a:schemeClr val="accent1">
+              <a:lumMod val="60000"/>
+              <a:lumOff val="40000"/>
+            </a:schemeClr>
+          </a:solidFill>
+          <a:ln>
+            <a:noFill/>
+          </a:ln>
+          <a:effectLst/>
+        </p:spPr>
+        <p:style>
+          <a:lnRef idx="1">
+            <a:schemeClr val="accent1"/>
+          </a:lnRef>
+          <a:fillRef idx="3">
+            <a:schemeClr val="accent1"/>
+          </a:fillRef>
+          <a:effectRef idx="2">
+            <a:schemeClr val="accent1"/>
+          </a:effectRef>
+          <a:fontRef idx="minor">
+            <a:schemeClr val="lt1"/>
+          </a:fontRef>
+        </p:style>
+        <p:txBody>
+          <a:bodyPr rtlCol="0" anchor="ctr"/>
+          <a:lstStyle/>
+          <a:p>
+            <a:pPr algn="ctr"/>
+            <a:r>
+              <a:rPr lang="en-US" sz="1000" dirty="0" err="1" smtClean="0">
+                <a:solidFill>
+                  <a:schemeClr val="tx1"/>
+                </a:solidFill>
+              </a:rPr>
+              <a:t>ZmqRadio</a:t>
+            </a:r>
+            <a:r>
+              <a:rPr lang="en-US" sz="1000" dirty="0" smtClean="0">
+                <a:solidFill>
+                  <a:schemeClr val="tx1"/>
+                </a:solidFill>
+              </a:rPr>
+              <a:t>::State</a:t>
+            </a:r>
+            <a:endParaRPr lang="en-US" sz="1000" dirty="0">
+              <a:solidFill>
+                <a:schemeClr val="tx1"/>
+              </a:solidFill>
+            </a:endParaRPr>
+          </a:p>
+        </p:txBody>
+      </p:sp>
+      <p:sp>
+        <p:nvSpPr>
+          <p:cNvPr id="38" name="Rectangle 37"/>
+          <p:cNvSpPr/>
+          <p:nvPr/>
+        </p:nvSpPr>
+        <p:spPr>
+          <a:xfrm>
+            <a:off x="5589509" y="1270460"/>
+            <a:ext cx="1763600" cy="188259"/>
+          </a:xfrm>
+          <a:prstGeom prst="rect">
+            <a:avLst/>
+          </a:prstGeom>
+          <a:solidFill>
+            <a:schemeClr val="accent1">
+              <a:lumMod val="60000"/>
+              <a:lumOff val="40000"/>
+            </a:schemeClr>
+          </a:solidFill>
+          <a:ln>
+            <a:noFill/>
+          </a:ln>
+          <a:effectLst/>
+        </p:spPr>
+        <p:style>
+          <a:lnRef idx="1">
+            <a:schemeClr val="accent1"/>
+          </a:lnRef>
+          <a:fillRef idx="3">
+            <a:schemeClr val="accent1"/>
+          </a:fillRef>
+          <a:effectRef idx="2">
+            <a:schemeClr val="accent1"/>
+          </a:effectRef>
+          <a:fontRef idx="minor">
+            <a:schemeClr val="lt1"/>
+          </a:fontRef>
+        </p:style>
+        <p:txBody>
+          <a:bodyPr rtlCol="0" anchor="ctr"/>
+          <a:lstStyle/>
+          <a:p>
+            <a:pPr algn="ctr"/>
+            <a:r>
+              <a:rPr lang="en-US" sz="1000" dirty="0" smtClean="0">
+                <a:solidFill>
+                  <a:schemeClr val="tx1"/>
+                </a:solidFill>
+              </a:rPr>
+              <a:t>Subscriber Task</a:t>
+            </a:r>
+            <a:endParaRPr lang="en-US" sz="1000" dirty="0">
+              <a:solidFill>
+                <a:schemeClr val="tx1"/>
+              </a:solidFill>
+            </a:endParaRPr>
+          </a:p>
+        </p:txBody>
+      </p:sp>
+      <p:cxnSp>
+        <p:nvCxnSpPr>
+          <p:cNvPr id="39" name="Straight Arrow Connector 38"/>
+          <p:cNvCxnSpPr>
+            <a:stCxn id="37" idx="2"/>
+          </p:cNvCxnSpPr>
+          <p:nvPr/>
+        </p:nvCxnSpPr>
+        <p:spPr>
+          <a:xfrm flipH="1">
+            <a:off x="3797647" y="1465153"/>
+            <a:ext cx="24822" cy="4951550"/>
+          </a:xfrm>
+          <a:prstGeom prst="straightConnector1">
+            <a:avLst/>
+          </a:prstGeom>
+          <a:ln w="12700" cap="flat" cmpd="sng" algn="ctr">
+            <a:solidFill>
+              <a:schemeClr val="bg1">
+                <a:lumMod val="75000"/>
+              </a:schemeClr>
             </a:solidFill>
             <a:prstDash val="solid"/>
             <a:round/>
@@ -21092,24 +20817,25 @@
       </p:cxnSp>
       <p:cxnSp>
         <p:nvCxnSpPr>
-          <p:cNvPr id="21" name="Straight Arrow Connector 20"/>
+          <p:cNvPr id="43" name="Straight Arrow Connector 42"/>
           <p:cNvCxnSpPr>
-            <a:stCxn id="11" idx="2"/>
-            <a:endCxn id="12" idx="0"/>
+            <a:stCxn id="38" idx="2"/>
           </p:cNvCxnSpPr>
           <p:nvPr/>
         </p:nvCxnSpPr>
         <p:spPr>
-          <a:xfrm>
-            <a:off x="1388135" y="4088338"/>
-            <a:ext cx="0" cy="502511"/>
+          <a:xfrm flipH="1">
+            <a:off x="6465064" y="1458719"/>
+            <a:ext cx="6245" cy="5239793"/>
           </a:xfrm>
           <a:prstGeom prst="straightConnector1">
             <a:avLst/>
           </a:prstGeom>
           <a:ln w="12700" cap="flat" cmpd="sng" algn="ctr">
             <a:solidFill>
-              <a:schemeClr val="tx1"/>
+              <a:schemeClr val="bg1">
+                <a:lumMod val="75000"/>
+              </a:schemeClr>
             </a:solidFill>
             <a:prstDash val="solid"/>
             <a:round/>
@@ -21135,24 +20861,21 @@
       </p:cxnSp>
       <p:cxnSp>
         <p:nvCxnSpPr>
-          <p:cNvPr id="23" name="Straight Arrow Connector 22"/>
-          <p:cNvCxnSpPr>
-            <a:stCxn id="12" idx="2"/>
-            <a:endCxn id="13" idx="0"/>
-          </p:cNvCxnSpPr>
+          <p:cNvPr id="48" name="Straight Arrow Connector 47"/>
+          <p:cNvCxnSpPr/>
           <p:nvPr/>
         </p:nvCxnSpPr>
         <p:spPr>
           <a:xfrm>
-            <a:off x="1388135" y="5138617"/>
-            <a:ext cx="0" cy="451419"/>
+            <a:off x="1701583" y="2204101"/>
+            <a:ext cx="1925436" cy="100009"/>
           </a:xfrm>
           <a:prstGeom prst="straightConnector1">
             <a:avLst/>
           </a:prstGeom>
           <a:ln w="12700" cap="flat" cmpd="sng" algn="ctr">
             <a:solidFill>
-              <a:schemeClr val="tx1"/>
+              <a:srgbClr val="FF0000"/>
             </a:solidFill>
             <a:prstDash val="solid"/>
             <a:round/>
@@ -21178,49 +20901,2060 @@
       </p:cxnSp>
       <p:sp>
         <p:nvSpPr>
-          <p:cNvPr id="4" name="Text Placeholder 3"/>
-          <p:cNvSpPr>
-            <a:spLocks noGrp="1"/>
-          </p:cNvSpPr>
-          <p:nvPr>
-            <p:ph type="body" sz="quarter" idx="17"/>
-          </p:nvPr>
-        </p:nvSpPr>
-        <p:spPr>
-          <a:xfrm>
-            <a:off x="2647179" y="1722092"/>
-            <a:ext cx="6166836" cy="4415712"/>
-          </a:xfrm>
-        </p:spPr>
-        <p:txBody>
-          <a:bodyPr/>
-          <a:lstStyle/>
-          <a:p>
-            <a:r>
-              <a:rPr lang="en-US" sz="2000" dirty="0" smtClean="0"/>
-              <a:t>Main work for the Zmq Radio Component</a:t>
-            </a:r>
-            <a:endParaRPr lang="en-US" sz="2000" dirty="0"/>
+          <p:cNvPr id="29" name="Rectangle 28"/>
+          <p:cNvSpPr/>
+          <p:nvPr/>
+        </p:nvSpPr>
+        <p:spPr>
+          <a:xfrm rot="5400000">
+            <a:off x="1370692" y="1836123"/>
+            <a:ext cx="489012" cy="201832"/>
+          </a:xfrm>
+          <a:prstGeom prst="rect">
+            <a:avLst/>
+          </a:prstGeom>
+          <a:solidFill>
+            <a:schemeClr val="accent1">
+              <a:lumMod val="60000"/>
+              <a:lumOff val="40000"/>
+            </a:schemeClr>
+          </a:solidFill>
+          <a:ln>
+            <a:noFill/>
+          </a:ln>
+          <a:effectLst/>
+        </p:spPr>
+        <p:style>
+          <a:lnRef idx="1">
+            <a:schemeClr val="accent1"/>
+          </a:lnRef>
+          <a:fillRef idx="3">
+            <a:schemeClr val="accent1"/>
+          </a:fillRef>
+          <a:effectRef idx="2">
+            <a:schemeClr val="accent1"/>
+          </a:effectRef>
+          <a:fontRef idx="minor">
+            <a:schemeClr val="lt1"/>
+          </a:fontRef>
+        </p:style>
+        <p:txBody>
+          <a:bodyPr rtlCol="0" anchor="ctr"/>
+          <a:lstStyle/>
+          <a:p>
+            <a:pPr algn="ctr"/>
+            <a:endParaRPr lang="en-US" sz="1000" dirty="0">
+              <a:solidFill>
+                <a:schemeClr val="tx1"/>
+              </a:solidFill>
+            </a:endParaRPr>
+          </a:p>
+        </p:txBody>
+      </p:sp>
+      <p:sp>
+        <p:nvSpPr>
+          <p:cNvPr id="41" name="Rectangle 40"/>
+          <p:cNvSpPr/>
+          <p:nvPr/>
+        </p:nvSpPr>
+        <p:spPr>
+          <a:xfrm rot="5400000">
+            <a:off x="3595348" y="2439357"/>
+            <a:ext cx="454239" cy="201832"/>
+          </a:xfrm>
+          <a:prstGeom prst="rect">
+            <a:avLst/>
+          </a:prstGeom>
+          <a:solidFill>
+            <a:schemeClr val="accent1">
+              <a:lumMod val="60000"/>
+              <a:lumOff val="40000"/>
+            </a:schemeClr>
+          </a:solidFill>
+          <a:ln>
+            <a:noFill/>
+          </a:ln>
+          <a:effectLst/>
+        </p:spPr>
+        <p:style>
+          <a:lnRef idx="1">
+            <a:schemeClr val="accent1"/>
+          </a:lnRef>
+          <a:fillRef idx="3">
+            <a:schemeClr val="accent1"/>
+          </a:fillRef>
+          <a:effectRef idx="2">
+            <a:schemeClr val="accent1"/>
+          </a:effectRef>
+          <a:fontRef idx="minor">
+            <a:schemeClr val="lt1"/>
+          </a:fontRef>
+        </p:style>
+        <p:txBody>
+          <a:bodyPr rtlCol="0" anchor="ctr"/>
+          <a:lstStyle/>
+          <a:p>
+            <a:pPr algn="ctr"/>
+            <a:endParaRPr lang="en-US" sz="1000" dirty="0">
+              <a:solidFill>
+                <a:schemeClr val="tx1"/>
+              </a:solidFill>
+            </a:endParaRPr>
+          </a:p>
+        </p:txBody>
+      </p:sp>
+      <p:sp>
+        <p:nvSpPr>
+          <p:cNvPr id="42" name="TextBox 41"/>
+          <p:cNvSpPr txBox="1"/>
+          <p:nvPr/>
+        </p:nvSpPr>
+        <p:spPr>
+          <a:xfrm>
+            <a:off x="1784420" y="1835660"/>
+            <a:ext cx="1922834" cy="276999"/>
+          </a:xfrm>
+          <a:prstGeom prst="rect">
+            <a:avLst/>
+          </a:prstGeom>
+          <a:noFill/>
+        </p:spPr>
+        <p:txBody>
+          <a:bodyPr wrap="none" rtlCol="0">
+            <a:spAutoFit/>
+          </a:bodyPr>
+          <a:lstStyle/>
+          <a:p>
+            <a:r>
+              <a:rPr lang="en-US" sz="1200" dirty="0" smtClean="0"/>
+              <a:t>State.transitionDisconnect()</a:t>
+            </a:r>
+            <a:endParaRPr lang="en-US" dirty="0"/>
+          </a:p>
+        </p:txBody>
+      </p:sp>
+      <p:sp>
+        <p:nvSpPr>
+          <p:cNvPr id="44" name="TextBox 43"/>
+          <p:cNvSpPr txBox="1"/>
+          <p:nvPr/>
+        </p:nvSpPr>
+        <p:spPr>
+          <a:xfrm>
+            <a:off x="3874340" y="2113187"/>
+            <a:ext cx="1861407" cy="507831"/>
+          </a:xfrm>
+          <a:prstGeom prst="rect">
+            <a:avLst/>
+          </a:prstGeom>
+          <a:noFill/>
+        </p:spPr>
+        <p:txBody>
+          <a:bodyPr wrap="none" rtlCol="0">
+            <a:spAutoFit/>
+          </a:bodyPr>
+          <a:lstStyle/>
+          <a:p>
+            <a:pPr marL="171450" indent="-171450">
+              <a:buFontTx/>
+              <a:buChar char="-"/>
+            </a:pPr>
+            <a:r>
+              <a:rPr lang="en-US" sz="900" dirty="0" smtClean="0"/>
+              <a:t>Close zmq resources</a:t>
+            </a:r>
+          </a:p>
+          <a:p>
+            <a:pPr marL="171450" indent="-171450">
+              <a:buFontTx/>
+              <a:buChar char="-"/>
+            </a:pPr>
+            <a:r>
+              <a:rPr lang="en-US" sz="900" dirty="0" smtClean="0"/>
+              <a:t>Block until all sockets are closed</a:t>
+            </a:r>
+          </a:p>
+          <a:p>
+            <a:pPr marL="171450" indent="-171450">
+              <a:buFontTx/>
+              <a:buChar char="-"/>
+            </a:pPr>
+            <a:r>
+              <a:rPr lang="en-US" sz="900" dirty="0" smtClean="0"/>
+              <a:t>State= DISCONNECTED</a:t>
+            </a:r>
+            <a:endParaRPr lang="en-US" sz="1100" dirty="0"/>
+          </a:p>
+        </p:txBody>
+      </p:sp>
+      <p:sp>
+        <p:nvSpPr>
+          <p:cNvPr id="47" name="Rectangle 46"/>
+          <p:cNvSpPr/>
+          <p:nvPr/>
+        </p:nvSpPr>
+        <p:spPr>
+          <a:xfrm rot="5400000">
+            <a:off x="1442365" y="2962164"/>
+            <a:ext cx="345665" cy="201832"/>
+          </a:xfrm>
+          <a:prstGeom prst="rect">
+            <a:avLst/>
+          </a:prstGeom>
+          <a:solidFill>
+            <a:schemeClr val="accent1">
+              <a:lumMod val="60000"/>
+              <a:lumOff val="40000"/>
+            </a:schemeClr>
+          </a:solidFill>
+          <a:ln>
+            <a:noFill/>
+          </a:ln>
+          <a:effectLst/>
+        </p:spPr>
+        <p:style>
+          <a:lnRef idx="1">
+            <a:schemeClr val="accent1"/>
+          </a:lnRef>
+          <a:fillRef idx="3">
+            <a:schemeClr val="accent1"/>
+          </a:fillRef>
+          <a:effectRef idx="2">
+            <a:schemeClr val="accent1"/>
+          </a:effectRef>
+          <a:fontRef idx="minor">
+            <a:schemeClr val="lt1"/>
+          </a:fontRef>
+        </p:style>
+        <p:txBody>
+          <a:bodyPr rtlCol="0" anchor="ctr"/>
+          <a:lstStyle/>
+          <a:p>
+            <a:pPr algn="ctr"/>
+            <a:endParaRPr lang="en-US" sz="1000" dirty="0">
+              <a:solidFill>
+                <a:schemeClr val="tx1"/>
+              </a:solidFill>
+            </a:endParaRPr>
+          </a:p>
+        </p:txBody>
+      </p:sp>
+      <p:cxnSp>
+        <p:nvCxnSpPr>
+          <p:cNvPr id="49" name="Straight Arrow Connector 48"/>
+          <p:cNvCxnSpPr/>
+          <p:nvPr/>
+        </p:nvCxnSpPr>
+        <p:spPr>
+          <a:xfrm>
+            <a:off x="181505" y="2705355"/>
+            <a:ext cx="1274902" cy="85785"/>
+          </a:xfrm>
+          <a:prstGeom prst="straightConnector1">
+            <a:avLst/>
+          </a:prstGeom>
+          <a:ln w="12700" cap="flat" cmpd="sng" algn="ctr">
+            <a:solidFill>
+              <a:srgbClr val="FF0000"/>
+            </a:solidFill>
+            <a:prstDash val="solid"/>
+            <a:round/>
+            <a:headEnd type="none" w="med" len="med"/>
+            <a:tailEnd type="triangle"/>
+          </a:ln>
+          <a:effectLst/>
+        </p:spPr>
+        <p:style>
+          <a:lnRef idx="2">
+            <a:schemeClr val="accent1"/>
+          </a:lnRef>
+          <a:fillRef idx="0">
+            <a:schemeClr val="accent1"/>
+          </a:fillRef>
+          <a:effectRef idx="1">
+            <a:schemeClr val="accent1"/>
+          </a:effectRef>
+          <a:fontRef idx="minor">
+            <a:schemeClr val="tx1"/>
+          </a:fontRef>
+        </p:style>
+      </p:cxnSp>
+      <p:sp>
+        <p:nvSpPr>
+          <p:cNvPr id="50" name="TextBox 49"/>
+          <p:cNvSpPr txBox="1"/>
+          <p:nvPr/>
+        </p:nvSpPr>
+        <p:spPr>
+          <a:xfrm>
+            <a:off x="286548" y="2490393"/>
+            <a:ext cx="712054" cy="276999"/>
+          </a:xfrm>
+          <a:prstGeom prst="rect">
+            <a:avLst/>
+          </a:prstGeom>
+          <a:noFill/>
+        </p:spPr>
+        <p:txBody>
+          <a:bodyPr wrap="none" rtlCol="0">
+            <a:spAutoFit/>
+          </a:bodyPr>
+          <a:lstStyle/>
+          <a:p>
+            <a:r>
+              <a:rPr lang="en-US" sz="1200" dirty="0" smtClean="0"/>
+              <a:t>Sched In</a:t>
+            </a:r>
+            <a:endParaRPr lang="en-US" dirty="0"/>
+          </a:p>
+        </p:txBody>
+      </p:sp>
+      <p:cxnSp>
+        <p:nvCxnSpPr>
+          <p:cNvPr id="32" name="Elbow Connector 31"/>
+          <p:cNvCxnSpPr/>
+          <p:nvPr/>
+        </p:nvCxnSpPr>
+        <p:spPr>
+          <a:xfrm rot="16200000" flipH="1">
+            <a:off x="1611588" y="3071656"/>
+            <a:ext cx="345665" cy="12700"/>
+          </a:xfrm>
+          <a:prstGeom prst="bentConnector5">
+            <a:avLst>
+              <a:gd name="adj1" fmla="val -1725"/>
+              <a:gd name="adj2" fmla="val 3160890"/>
+              <a:gd name="adj3" fmla="val 101725"/>
+            </a:avLst>
+          </a:prstGeom>
+          <a:ln w="12700" cap="flat" cmpd="sng" algn="ctr">
+            <a:solidFill>
+              <a:srgbClr val="FF0000"/>
+            </a:solidFill>
+            <a:prstDash val="solid"/>
+            <a:round/>
+            <a:headEnd type="none"/>
+            <a:tailEnd type="triangle"/>
+          </a:ln>
+          <a:effectLst/>
+        </p:spPr>
+        <p:style>
+          <a:lnRef idx="2">
+            <a:schemeClr val="accent1"/>
+          </a:lnRef>
+          <a:fillRef idx="0">
+            <a:schemeClr val="accent1"/>
+          </a:fillRef>
+          <a:effectRef idx="1">
+            <a:schemeClr val="accent1"/>
+          </a:effectRef>
+          <a:fontRef idx="minor">
+            <a:schemeClr val="tx1"/>
+          </a:fontRef>
+        </p:style>
+      </p:cxnSp>
+      <p:sp>
+        <p:nvSpPr>
+          <p:cNvPr id="59" name="TextBox 58"/>
+          <p:cNvSpPr txBox="1"/>
+          <p:nvPr/>
+        </p:nvSpPr>
+        <p:spPr>
+          <a:xfrm>
+            <a:off x="1675434" y="3231289"/>
+            <a:ext cx="1332416" cy="230832"/>
+          </a:xfrm>
+          <a:prstGeom prst="rect">
+            <a:avLst/>
+          </a:prstGeom>
+          <a:noFill/>
+        </p:spPr>
+        <p:txBody>
+          <a:bodyPr wrap="none" rtlCol="0">
+            <a:spAutoFit/>
+          </a:bodyPr>
+          <a:lstStyle/>
+          <a:p>
+            <a:r>
+              <a:rPr lang="en-US" sz="900" dirty="0" smtClean="0"/>
+              <a:t>Attempt Reconnect Fails</a:t>
+            </a:r>
+            <a:endParaRPr lang="en-US" sz="1100" dirty="0"/>
+          </a:p>
+        </p:txBody>
+      </p:sp>
+      <p:cxnSp>
+        <p:nvCxnSpPr>
+          <p:cNvPr id="60" name="Straight Arrow Connector 59"/>
+          <p:cNvCxnSpPr/>
+          <p:nvPr/>
+        </p:nvCxnSpPr>
+        <p:spPr>
+          <a:xfrm>
+            <a:off x="1625313" y="3756735"/>
+            <a:ext cx="2146936" cy="127170"/>
+          </a:xfrm>
+          <a:prstGeom prst="straightConnector1">
+            <a:avLst/>
+          </a:prstGeom>
+          <a:ln w="12700" cap="flat" cmpd="sng" algn="ctr">
+            <a:solidFill>
+              <a:srgbClr val="FF0000"/>
+            </a:solidFill>
+            <a:prstDash val="solid"/>
+            <a:round/>
+            <a:headEnd type="none" w="med" len="med"/>
+            <a:tailEnd type="triangle"/>
+          </a:ln>
+          <a:effectLst/>
+        </p:spPr>
+        <p:style>
+          <a:lnRef idx="2">
+            <a:schemeClr val="accent1"/>
+          </a:lnRef>
+          <a:fillRef idx="0">
+            <a:schemeClr val="accent1"/>
+          </a:fillRef>
+          <a:effectRef idx="1">
+            <a:schemeClr val="accent1"/>
+          </a:effectRef>
+          <a:fontRef idx="minor">
+            <a:schemeClr val="tx1"/>
+          </a:fontRef>
+        </p:style>
+      </p:cxnSp>
+      <p:sp>
+        <p:nvSpPr>
+          <p:cNvPr id="66" name="TextBox 65"/>
+          <p:cNvSpPr txBox="1"/>
+          <p:nvPr/>
+        </p:nvSpPr>
+        <p:spPr>
+          <a:xfrm>
+            <a:off x="1643598" y="3471131"/>
+            <a:ext cx="1922834" cy="276999"/>
+          </a:xfrm>
+          <a:prstGeom prst="rect">
+            <a:avLst/>
+          </a:prstGeom>
+          <a:noFill/>
+        </p:spPr>
+        <p:txBody>
+          <a:bodyPr wrap="none" rtlCol="0">
+            <a:spAutoFit/>
+          </a:bodyPr>
+          <a:lstStyle/>
+          <a:p>
+            <a:r>
+              <a:rPr lang="en-US" sz="1200" dirty="0" smtClean="0"/>
+              <a:t>State.transitionDisconnect()</a:t>
+            </a:r>
+            <a:endParaRPr lang="en-US" dirty="0"/>
+          </a:p>
+        </p:txBody>
+      </p:sp>
+      <p:sp>
+        <p:nvSpPr>
+          <p:cNvPr id="67" name="Rectangle 66"/>
+          <p:cNvSpPr/>
+          <p:nvPr/>
+        </p:nvSpPr>
+        <p:spPr>
+          <a:xfrm rot="5400000">
+            <a:off x="3718229" y="3967623"/>
+            <a:ext cx="211854" cy="201832"/>
+          </a:xfrm>
+          <a:prstGeom prst="rect">
+            <a:avLst/>
+          </a:prstGeom>
+          <a:solidFill>
+            <a:schemeClr val="accent1">
+              <a:lumMod val="60000"/>
+              <a:lumOff val="40000"/>
+            </a:schemeClr>
+          </a:solidFill>
+          <a:ln>
+            <a:noFill/>
+          </a:ln>
+          <a:effectLst/>
+        </p:spPr>
+        <p:style>
+          <a:lnRef idx="1">
+            <a:schemeClr val="accent1"/>
+          </a:lnRef>
+          <a:fillRef idx="3">
+            <a:schemeClr val="accent1"/>
+          </a:fillRef>
+          <a:effectRef idx="2">
+            <a:schemeClr val="accent1"/>
+          </a:effectRef>
+          <a:fontRef idx="minor">
+            <a:schemeClr val="lt1"/>
+          </a:fontRef>
+        </p:style>
+        <p:txBody>
+          <a:bodyPr rtlCol="0" anchor="ctr"/>
+          <a:lstStyle/>
+          <a:p>
+            <a:pPr algn="ctr"/>
+            <a:endParaRPr lang="en-US" sz="1000" dirty="0">
+              <a:solidFill>
+                <a:schemeClr val="tx1"/>
+              </a:solidFill>
+            </a:endParaRPr>
+          </a:p>
+        </p:txBody>
+      </p:sp>
+      <p:sp>
+        <p:nvSpPr>
+          <p:cNvPr id="70" name="TextBox 69"/>
+          <p:cNvSpPr txBox="1"/>
+          <p:nvPr/>
+        </p:nvSpPr>
+        <p:spPr>
+          <a:xfrm>
+            <a:off x="3892416" y="3884663"/>
+            <a:ext cx="1446230" cy="230832"/>
+          </a:xfrm>
+          <a:prstGeom prst="rect">
+            <a:avLst/>
+          </a:prstGeom>
+          <a:noFill/>
+        </p:spPr>
+        <p:txBody>
+          <a:bodyPr wrap="none" rtlCol="0">
+            <a:spAutoFit/>
+          </a:bodyPr>
+          <a:lstStyle/>
+          <a:p>
+            <a:pPr marL="171450" indent="-171450">
+              <a:buFontTx/>
+              <a:buChar char="-"/>
+            </a:pPr>
+            <a:r>
+              <a:rPr lang="en-US" sz="900" dirty="0" smtClean="0"/>
+              <a:t>State = DISCONNECTED</a:t>
+            </a:r>
+            <a:endParaRPr lang="en-US" sz="1100" dirty="0"/>
+          </a:p>
+        </p:txBody>
+      </p:sp>
+      <p:sp>
+        <p:nvSpPr>
+          <p:cNvPr id="80" name="Rectangle 79"/>
+          <p:cNvSpPr/>
+          <p:nvPr/>
+        </p:nvSpPr>
+        <p:spPr>
+          <a:xfrm rot="5400000">
+            <a:off x="1427834" y="5015364"/>
+            <a:ext cx="345665" cy="201832"/>
+          </a:xfrm>
+          <a:prstGeom prst="rect">
+            <a:avLst/>
+          </a:prstGeom>
+          <a:solidFill>
+            <a:schemeClr val="accent1">
+              <a:lumMod val="60000"/>
+              <a:lumOff val="40000"/>
+            </a:schemeClr>
+          </a:solidFill>
+          <a:ln>
+            <a:noFill/>
+          </a:ln>
+          <a:effectLst/>
+        </p:spPr>
+        <p:style>
+          <a:lnRef idx="1">
+            <a:schemeClr val="accent1"/>
+          </a:lnRef>
+          <a:fillRef idx="3">
+            <a:schemeClr val="accent1"/>
+          </a:fillRef>
+          <a:effectRef idx="2">
+            <a:schemeClr val="accent1"/>
+          </a:effectRef>
+          <a:fontRef idx="minor">
+            <a:schemeClr val="lt1"/>
+          </a:fontRef>
+        </p:style>
+        <p:txBody>
+          <a:bodyPr rtlCol="0" anchor="ctr"/>
+          <a:lstStyle/>
+          <a:p>
+            <a:pPr algn="ctr"/>
+            <a:endParaRPr lang="en-US" sz="1000" dirty="0">
+              <a:solidFill>
+                <a:schemeClr val="tx1"/>
+              </a:solidFill>
+            </a:endParaRPr>
+          </a:p>
+        </p:txBody>
+      </p:sp>
+      <p:cxnSp>
+        <p:nvCxnSpPr>
+          <p:cNvPr id="81" name="Elbow Connector 80"/>
+          <p:cNvCxnSpPr/>
+          <p:nvPr/>
+        </p:nvCxnSpPr>
+        <p:spPr>
+          <a:xfrm rot="16200000" flipH="1">
+            <a:off x="1590473" y="5116631"/>
+            <a:ext cx="345665" cy="12700"/>
+          </a:xfrm>
+          <a:prstGeom prst="bentConnector5">
+            <a:avLst>
+              <a:gd name="adj1" fmla="val -1725"/>
+              <a:gd name="adj2" fmla="val 3160890"/>
+              <a:gd name="adj3" fmla="val 101725"/>
+            </a:avLst>
+          </a:prstGeom>
+          <a:ln w="12700" cap="flat" cmpd="sng" algn="ctr">
+            <a:solidFill>
+              <a:srgbClr val="FF0000"/>
+            </a:solidFill>
+            <a:prstDash val="solid"/>
+            <a:round/>
+            <a:headEnd type="none"/>
+            <a:tailEnd type="triangle"/>
+          </a:ln>
+          <a:effectLst/>
+        </p:spPr>
+        <p:style>
+          <a:lnRef idx="2">
+            <a:schemeClr val="accent1"/>
+          </a:lnRef>
+          <a:fillRef idx="0">
+            <a:schemeClr val="accent1"/>
+          </a:fillRef>
+          <a:effectRef idx="1">
+            <a:schemeClr val="accent1"/>
+          </a:effectRef>
+          <a:fontRef idx="minor">
+            <a:schemeClr val="tx1"/>
+          </a:fontRef>
+        </p:style>
+      </p:cxnSp>
+      <p:sp>
+        <p:nvSpPr>
+          <p:cNvPr id="82" name="TextBox 81"/>
+          <p:cNvSpPr txBox="1"/>
+          <p:nvPr/>
+        </p:nvSpPr>
+        <p:spPr>
+          <a:xfrm>
+            <a:off x="1673435" y="5448205"/>
+            <a:ext cx="1556836" cy="230832"/>
+          </a:xfrm>
+          <a:prstGeom prst="rect">
+            <a:avLst/>
+          </a:prstGeom>
+          <a:noFill/>
+        </p:spPr>
+        <p:txBody>
+          <a:bodyPr wrap="none" rtlCol="0">
+            <a:spAutoFit/>
+          </a:bodyPr>
+          <a:lstStyle/>
+          <a:p>
+            <a:r>
+              <a:rPr lang="en-US" sz="900" dirty="0" smtClean="0"/>
+              <a:t>Attempt Reconnect Succeeds</a:t>
+            </a:r>
+            <a:endParaRPr lang="en-US" sz="1100" dirty="0"/>
+          </a:p>
+        </p:txBody>
+      </p:sp>
+      <p:cxnSp>
+        <p:nvCxnSpPr>
+          <p:cNvPr id="83" name="Straight Arrow Connector 82"/>
+          <p:cNvCxnSpPr/>
+          <p:nvPr/>
+        </p:nvCxnSpPr>
+        <p:spPr>
+          <a:xfrm>
+            <a:off x="285173" y="4795611"/>
+            <a:ext cx="1274902" cy="85785"/>
+          </a:xfrm>
+          <a:prstGeom prst="straightConnector1">
+            <a:avLst/>
+          </a:prstGeom>
+          <a:ln w="12700" cap="flat" cmpd="sng" algn="ctr">
+            <a:solidFill>
+              <a:srgbClr val="FF0000"/>
+            </a:solidFill>
+            <a:prstDash val="solid"/>
+            <a:round/>
+            <a:headEnd type="none" w="med" len="med"/>
+            <a:tailEnd type="triangle"/>
+          </a:ln>
+          <a:effectLst/>
+        </p:spPr>
+        <p:style>
+          <a:lnRef idx="2">
+            <a:schemeClr val="accent1"/>
+          </a:lnRef>
+          <a:fillRef idx="0">
+            <a:schemeClr val="accent1"/>
+          </a:fillRef>
+          <a:effectRef idx="1">
+            <a:schemeClr val="accent1"/>
+          </a:effectRef>
+          <a:fontRef idx="minor">
+            <a:schemeClr val="tx1"/>
+          </a:fontRef>
+        </p:style>
+      </p:cxnSp>
+      <p:sp>
+        <p:nvSpPr>
+          <p:cNvPr id="84" name="TextBox 83"/>
+          <p:cNvSpPr txBox="1"/>
+          <p:nvPr/>
+        </p:nvSpPr>
+        <p:spPr>
+          <a:xfrm>
+            <a:off x="114992" y="4475961"/>
+            <a:ext cx="712054" cy="276999"/>
+          </a:xfrm>
+          <a:prstGeom prst="rect">
+            <a:avLst/>
+          </a:prstGeom>
+          <a:noFill/>
+        </p:spPr>
+        <p:txBody>
+          <a:bodyPr wrap="none" rtlCol="0">
+            <a:spAutoFit/>
+          </a:bodyPr>
+          <a:lstStyle/>
+          <a:p>
+            <a:r>
+              <a:rPr lang="en-US" sz="1200" dirty="0" smtClean="0"/>
+              <a:t>Sched In</a:t>
+            </a:r>
+            <a:endParaRPr lang="en-US" dirty="0"/>
+          </a:p>
+        </p:txBody>
+      </p:sp>
+      <p:cxnSp>
+        <p:nvCxnSpPr>
+          <p:cNvPr id="85" name="Straight Arrow Connector 84"/>
+          <p:cNvCxnSpPr/>
+          <p:nvPr/>
+        </p:nvCxnSpPr>
+        <p:spPr>
+          <a:xfrm>
+            <a:off x="1597340" y="5853281"/>
+            <a:ext cx="2150345" cy="172118"/>
+          </a:xfrm>
+          <a:prstGeom prst="straightConnector1">
+            <a:avLst/>
+          </a:prstGeom>
+          <a:ln w="12700" cap="flat" cmpd="sng" algn="ctr">
+            <a:solidFill>
+              <a:srgbClr val="FF0000"/>
+            </a:solidFill>
+            <a:prstDash val="solid"/>
+            <a:round/>
+            <a:headEnd type="none" w="med" len="med"/>
+            <a:tailEnd type="triangle"/>
+          </a:ln>
+          <a:effectLst/>
+        </p:spPr>
+        <p:style>
+          <a:lnRef idx="2">
+            <a:schemeClr val="accent1"/>
+          </a:lnRef>
+          <a:fillRef idx="0">
+            <a:schemeClr val="accent1"/>
+          </a:fillRef>
+          <a:effectRef idx="1">
+            <a:schemeClr val="accent1"/>
+          </a:effectRef>
+          <a:fontRef idx="minor">
+            <a:schemeClr val="tx1"/>
+          </a:fontRef>
+        </p:style>
+      </p:cxnSp>
+      <p:sp>
+        <p:nvSpPr>
+          <p:cNvPr id="86" name="TextBox 85"/>
+          <p:cNvSpPr txBox="1"/>
+          <p:nvPr/>
+        </p:nvSpPr>
+        <p:spPr>
+          <a:xfrm>
+            <a:off x="1726163" y="5647556"/>
+            <a:ext cx="1749325" cy="276999"/>
+          </a:xfrm>
+          <a:prstGeom prst="rect">
+            <a:avLst/>
+          </a:prstGeom>
+          <a:noFill/>
+        </p:spPr>
+        <p:txBody>
+          <a:bodyPr wrap="none" rtlCol="0">
+            <a:spAutoFit/>
+          </a:bodyPr>
+          <a:lstStyle/>
+          <a:p>
+            <a:r>
+              <a:rPr lang="en-US" sz="1200" dirty="0" smtClean="0"/>
+              <a:t>State.transitionConnect()</a:t>
+            </a:r>
+            <a:endParaRPr lang="en-US" dirty="0"/>
+          </a:p>
+        </p:txBody>
+      </p:sp>
+      <p:sp>
+        <p:nvSpPr>
+          <p:cNvPr id="90" name="Rectangle 89"/>
+          <p:cNvSpPr/>
+          <p:nvPr/>
+        </p:nvSpPr>
+        <p:spPr>
+          <a:xfrm rot="5400000">
+            <a:off x="3726201" y="6034018"/>
+            <a:ext cx="211854" cy="201832"/>
+          </a:xfrm>
+          <a:prstGeom prst="rect">
+            <a:avLst/>
+          </a:prstGeom>
+          <a:solidFill>
+            <a:schemeClr val="accent1">
+              <a:lumMod val="60000"/>
+              <a:lumOff val="40000"/>
+            </a:schemeClr>
+          </a:solidFill>
+          <a:ln>
+            <a:noFill/>
+          </a:ln>
+          <a:effectLst/>
+        </p:spPr>
+        <p:style>
+          <a:lnRef idx="1">
+            <a:schemeClr val="accent1"/>
+          </a:lnRef>
+          <a:fillRef idx="3">
+            <a:schemeClr val="accent1"/>
+          </a:fillRef>
+          <a:effectRef idx="2">
+            <a:schemeClr val="accent1"/>
+          </a:effectRef>
+          <a:fontRef idx="minor">
+            <a:schemeClr val="lt1"/>
+          </a:fontRef>
+        </p:style>
+        <p:txBody>
+          <a:bodyPr rtlCol="0" anchor="ctr"/>
+          <a:lstStyle/>
+          <a:p>
+            <a:pPr algn="ctr"/>
+            <a:endParaRPr lang="en-US" sz="1000" dirty="0">
+              <a:solidFill>
+                <a:schemeClr val="tx1"/>
+              </a:solidFill>
+            </a:endParaRPr>
+          </a:p>
+        </p:txBody>
+      </p:sp>
+      <p:sp>
+        <p:nvSpPr>
+          <p:cNvPr id="91" name="TextBox 90"/>
+          <p:cNvSpPr txBox="1"/>
+          <p:nvPr/>
+        </p:nvSpPr>
+        <p:spPr>
+          <a:xfrm>
+            <a:off x="3900388" y="5951058"/>
+            <a:ext cx="1293944" cy="230832"/>
+          </a:xfrm>
+          <a:prstGeom prst="rect">
+            <a:avLst/>
+          </a:prstGeom>
+          <a:noFill/>
+        </p:spPr>
+        <p:txBody>
+          <a:bodyPr wrap="none" rtlCol="0">
+            <a:spAutoFit/>
+          </a:bodyPr>
+          <a:lstStyle/>
+          <a:p>
+            <a:pPr marL="171450" indent="-171450">
+              <a:buFontTx/>
+              <a:buChar char="-"/>
+            </a:pPr>
+            <a:r>
+              <a:rPr lang="en-US" sz="900" dirty="0" smtClean="0"/>
+              <a:t>State = CONNECTED</a:t>
+            </a:r>
+            <a:endParaRPr lang="en-US" sz="1100" dirty="0"/>
+          </a:p>
+        </p:txBody>
+      </p:sp>
+      <p:sp>
+        <p:nvSpPr>
+          <p:cNvPr id="103" name="Rectangle 102"/>
+          <p:cNvSpPr/>
+          <p:nvPr/>
+        </p:nvSpPr>
+        <p:spPr>
+          <a:xfrm rot="5400000">
+            <a:off x="4065548" y="4005172"/>
+            <a:ext cx="4818589" cy="208907"/>
+          </a:xfrm>
+          <a:prstGeom prst="rect">
+            <a:avLst/>
+          </a:prstGeom>
+          <a:solidFill>
+            <a:schemeClr val="accent1">
+              <a:lumMod val="60000"/>
+              <a:lumOff val="40000"/>
+            </a:schemeClr>
+          </a:solidFill>
+          <a:ln>
+            <a:noFill/>
+          </a:ln>
+          <a:effectLst/>
+        </p:spPr>
+        <p:style>
+          <a:lnRef idx="1">
+            <a:schemeClr val="accent1"/>
+          </a:lnRef>
+          <a:fillRef idx="3">
+            <a:schemeClr val="accent1"/>
+          </a:fillRef>
+          <a:effectRef idx="2">
+            <a:schemeClr val="accent1"/>
+          </a:effectRef>
+          <a:fontRef idx="minor">
+            <a:schemeClr val="lt1"/>
+          </a:fontRef>
+        </p:style>
+        <p:txBody>
+          <a:bodyPr rtlCol="0" anchor="ctr"/>
+          <a:lstStyle/>
+          <a:p>
+            <a:pPr algn="ctr"/>
+            <a:endParaRPr lang="en-US" sz="1000" dirty="0">
+              <a:solidFill>
+                <a:schemeClr val="tx1"/>
+              </a:solidFill>
+            </a:endParaRPr>
+          </a:p>
+        </p:txBody>
+      </p:sp>
+      <p:cxnSp>
+        <p:nvCxnSpPr>
+          <p:cNvPr id="105" name="Straight Arrow Connector 104"/>
+          <p:cNvCxnSpPr/>
+          <p:nvPr/>
+        </p:nvCxnSpPr>
+        <p:spPr>
+          <a:xfrm flipH="1">
+            <a:off x="6614520" y="2602285"/>
+            <a:ext cx="1751962" cy="61226"/>
+          </a:xfrm>
+          <a:prstGeom prst="straightConnector1">
+            <a:avLst/>
+          </a:prstGeom>
+          <a:ln w="12700" cap="flat" cmpd="sng" algn="ctr">
+            <a:solidFill>
+              <a:srgbClr val="FF0000"/>
+            </a:solidFill>
+            <a:prstDash val="solid"/>
+            <a:round/>
+            <a:headEnd type="none" w="med" len="med"/>
+            <a:tailEnd type="triangle"/>
+          </a:ln>
+          <a:effectLst/>
+        </p:spPr>
+        <p:style>
+          <a:lnRef idx="2">
+            <a:schemeClr val="accent1"/>
+          </a:lnRef>
+          <a:fillRef idx="0">
+            <a:schemeClr val="accent1"/>
+          </a:fillRef>
+          <a:effectRef idx="1">
+            <a:schemeClr val="accent1"/>
+          </a:effectRef>
+          <a:fontRef idx="minor">
+            <a:schemeClr val="tx1"/>
+          </a:fontRef>
+        </p:style>
+      </p:cxnSp>
+      <p:sp>
+        <p:nvSpPr>
+          <p:cNvPr id="106" name="TextBox 105"/>
+          <p:cNvSpPr txBox="1"/>
+          <p:nvPr/>
+        </p:nvSpPr>
+        <p:spPr>
+          <a:xfrm>
+            <a:off x="6886149" y="2628892"/>
+            <a:ext cx="1956044" cy="230832"/>
+          </a:xfrm>
+          <a:prstGeom prst="rect">
+            <a:avLst/>
+          </a:prstGeom>
+          <a:noFill/>
+        </p:spPr>
+        <p:txBody>
+          <a:bodyPr wrap="square" rtlCol="0">
+            <a:spAutoFit/>
+          </a:bodyPr>
+          <a:lstStyle/>
+          <a:p>
+            <a:r>
+              <a:rPr lang="en-US" sz="900" dirty="0" smtClean="0"/>
+              <a:t>Close </a:t>
+            </a:r>
+            <a:r>
+              <a:rPr lang="en-US" sz="900" dirty="0" err="1" smtClean="0"/>
+              <a:t>subSocket</a:t>
+            </a:r>
+            <a:r>
+              <a:rPr lang="en-US" sz="900" dirty="0" smtClean="0"/>
+              <a:t> because of zmq error</a:t>
+            </a:r>
+            <a:endParaRPr lang="en-US" sz="1100" dirty="0"/>
+          </a:p>
+        </p:txBody>
+      </p:sp>
+      <p:cxnSp>
+        <p:nvCxnSpPr>
+          <p:cNvPr id="109" name="Straight Arrow Connector 108"/>
+          <p:cNvCxnSpPr/>
+          <p:nvPr/>
+        </p:nvCxnSpPr>
+        <p:spPr>
+          <a:xfrm flipH="1">
+            <a:off x="3892416" y="2817430"/>
+            <a:ext cx="2572648" cy="341792"/>
+          </a:xfrm>
+          <a:prstGeom prst="straightConnector1">
+            <a:avLst/>
+          </a:prstGeom>
+          <a:ln w="12700" cap="flat" cmpd="sng" algn="ctr">
+            <a:solidFill>
+              <a:srgbClr val="FF0000"/>
+            </a:solidFill>
+            <a:prstDash val="solid"/>
+            <a:round/>
+            <a:headEnd type="none" w="med" len="med"/>
+            <a:tailEnd type="triangle"/>
+          </a:ln>
+          <a:effectLst/>
+        </p:spPr>
+        <p:style>
+          <a:lnRef idx="2">
+            <a:schemeClr val="accent1"/>
+          </a:lnRef>
+          <a:fillRef idx="0">
+            <a:schemeClr val="accent1"/>
+          </a:fillRef>
+          <a:effectRef idx="1">
+            <a:schemeClr val="accent1"/>
+          </a:effectRef>
+          <a:fontRef idx="minor">
+            <a:schemeClr val="tx1"/>
+          </a:fontRef>
+        </p:style>
+      </p:cxnSp>
+      <p:sp>
+        <p:nvSpPr>
+          <p:cNvPr id="111" name="TextBox 110"/>
+          <p:cNvSpPr txBox="1"/>
+          <p:nvPr/>
+        </p:nvSpPr>
+        <p:spPr>
+          <a:xfrm>
+            <a:off x="4569891" y="2667710"/>
+            <a:ext cx="1497526" cy="230832"/>
+          </a:xfrm>
+          <a:prstGeom prst="rect">
+            <a:avLst/>
+          </a:prstGeom>
+          <a:noFill/>
+        </p:spPr>
+        <p:txBody>
+          <a:bodyPr wrap="none" rtlCol="0">
+            <a:spAutoFit/>
+          </a:bodyPr>
+          <a:lstStyle/>
+          <a:p>
+            <a:r>
+              <a:rPr lang="en-US" sz="900" dirty="0" smtClean="0"/>
+              <a:t>State.transitionDisconnect()</a:t>
+            </a:r>
+            <a:endParaRPr lang="en-US" sz="1100" dirty="0"/>
+          </a:p>
+        </p:txBody>
+      </p:sp>
+      <p:sp>
+        <p:nvSpPr>
+          <p:cNvPr id="113" name="Rectangle 112"/>
+          <p:cNvSpPr/>
+          <p:nvPr/>
+        </p:nvSpPr>
+        <p:spPr>
+          <a:xfrm rot="5400000">
+            <a:off x="3698396" y="3178573"/>
+            <a:ext cx="223323" cy="201832"/>
+          </a:xfrm>
+          <a:prstGeom prst="rect">
+            <a:avLst/>
+          </a:prstGeom>
+          <a:solidFill>
+            <a:schemeClr val="accent1">
+              <a:lumMod val="60000"/>
+              <a:lumOff val="40000"/>
+            </a:schemeClr>
+          </a:solidFill>
+          <a:ln>
+            <a:noFill/>
+          </a:ln>
+          <a:effectLst/>
+        </p:spPr>
+        <p:style>
+          <a:lnRef idx="1">
+            <a:schemeClr val="accent1"/>
+          </a:lnRef>
+          <a:fillRef idx="3">
+            <a:schemeClr val="accent1"/>
+          </a:fillRef>
+          <a:effectRef idx="2">
+            <a:schemeClr val="accent1"/>
+          </a:effectRef>
+          <a:fontRef idx="minor">
+            <a:schemeClr val="lt1"/>
+          </a:fontRef>
+        </p:style>
+        <p:txBody>
+          <a:bodyPr rtlCol="0" anchor="ctr"/>
+          <a:lstStyle/>
+          <a:p>
+            <a:pPr algn="ctr"/>
+            <a:endParaRPr lang="en-US" sz="1000" dirty="0">
+              <a:solidFill>
+                <a:schemeClr val="tx1"/>
+              </a:solidFill>
+            </a:endParaRPr>
+          </a:p>
+        </p:txBody>
+      </p:sp>
+      <p:sp>
+        <p:nvSpPr>
+          <p:cNvPr id="114" name="TextBox 113"/>
+          <p:cNvSpPr txBox="1"/>
+          <p:nvPr/>
+        </p:nvSpPr>
+        <p:spPr>
+          <a:xfrm>
+            <a:off x="3900388" y="3114530"/>
+            <a:ext cx="1446230" cy="230832"/>
+          </a:xfrm>
+          <a:prstGeom prst="rect">
+            <a:avLst/>
+          </a:prstGeom>
+          <a:noFill/>
+        </p:spPr>
+        <p:txBody>
+          <a:bodyPr wrap="none" rtlCol="0">
+            <a:spAutoFit/>
+          </a:bodyPr>
+          <a:lstStyle/>
+          <a:p>
+            <a:pPr marL="171450" indent="-171450">
+              <a:buFontTx/>
+              <a:buChar char="-"/>
+            </a:pPr>
+            <a:r>
+              <a:rPr lang="en-US" sz="900" dirty="0" smtClean="0"/>
+              <a:t>State = DISCONNECTED</a:t>
+            </a:r>
+            <a:endParaRPr lang="en-US" sz="1100" dirty="0"/>
+          </a:p>
+        </p:txBody>
+      </p:sp>
+      <p:sp>
+        <p:nvSpPr>
+          <p:cNvPr id="119" name="TextBox 118"/>
+          <p:cNvSpPr txBox="1"/>
+          <p:nvPr/>
+        </p:nvSpPr>
+        <p:spPr>
+          <a:xfrm>
+            <a:off x="2129406" y="4773975"/>
+            <a:ext cx="643125" cy="230832"/>
+          </a:xfrm>
+          <a:prstGeom prst="rect">
+            <a:avLst/>
+          </a:prstGeom>
+          <a:noFill/>
+        </p:spPr>
+        <p:txBody>
+          <a:bodyPr wrap="none" rtlCol="0">
+            <a:spAutoFit/>
+          </a:bodyPr>
+          <a:lstStyle/>
+          <a:p>
+            <a:r>
+              <a:rPr lang="en-US" sz="900" dirty="0" smtClean="0"/>
+              <a:t>Connect()</a:t>
+            </a:r>
+            <a:endParaRPr lang="en-US" sz="1100" dirty="0"/>
+          </a:p>
+        </p:txBody>
+      </p:sp>
+      <p:sp>
+        <p:nvSpPr>
+          <p:cNvPr id="120" name="TextBox 119"/>
+          <p:cNvSpPr txBox="1"/>
+          <p:nvPr/>
+        </p:nvSpPr>
+        <p:spPr>
+          <a:xfrm>
+            <a:off x="2101705" y="2663511"/>
+            <a:ext cx="643125" cy="230832"/>
+          </a:xfrm>
+          <a:prstGeom prst="rect">
+            <a:avLst/>
+          </a:prstGeom>
+          <a:noFill/>
+        </p:spPr>
+        <p:txBody>
+          <a:bodyPr wrap="none" rtlCol="0">
+            <a:spAutoFit/>
+          </a:bodyPr>
+          <a:lstStyle/>
+          <a:p>
+            <a:r>
+              <a:rPr lang="en-US" sz="900" smtClean="0"/>
+              <a:t>Connect()</a:t>
+            </a:r>
+            <a:endParaRPr lang="en-US" sz="1100" dirty="0"/>
+          </a:p>
+        </p:txBody>
+      </p:sp>
+      <p:cxnSp>
+        <p:nvCxnSpPr>
+          <p:cNvPr id="121" name="Elbow Connector 120"/>
+          <p:cNvCxnSpPr/>
+          <p:nvPr/>
+        </p:nvCxnSpPr>
+        <p:spPr>
+          <a:xfrm rot="16200000" flipH="1">
+            <a:off x="6476636" y="2103521"/>
+            <a:ext cx="345665" cy="12700"/>
+          </a:xfrm>
+          <a:prstGeom prst="bentConnector5">
+            <a:avLst>
+              <a:gd name="adj1" fmla="val -1725"/>
+              <a:gd name="adj2" fmla="val 3160890"/>
+              <a:gd name="adj3" fmla="val 101725"/>
+            </a:avLst>
+          </a:prstGeom>
+          <a:ln w="12700" cap="flat" cmpd="sng" algn="ctr">
+            <a:solidFill>
+              <a:srgbClr val="FF0000"/>
+            </a:solidFill>
+            <a:prstDash val="solid"/>
+            <a:round/>
+            <a:headEnd type="none"/>
+            <a:tailEnd type="triangle"/>
+          </a:ln>
+          <a:effectLst/>
+        </p:spPr>
+        <p:style>
+          <a:lnRef idx="2">
+            <a:schemeClr val="accent1"/>
+          </a:lnRef>
+          <a:fillRef idx="0">
+            <a:schemeClr val="accent1"/>
+          </a:fillRef>
+          <a:effectRef idx="1">
+            <a:schemeClr val="accent1"/>
+          </a:effectRef>
+          <a:fontRef idx="minor">
+            <a:schemeClr val="tx1"/>
+          </a:fontRef>
+        </p:style>
+      </p:cxnSp>
+      <p:sp>
+        <p:nvSpPr>
+          <p:cNvPr id="123" name="TextBox 122"/>
+          <p:cNvSpPr txBox="1"/>
+          <p:nvPr/>
+        </p:nvSpPr>
+        <p:spPr>
+          <a:xfrm>
+            <a:off x="6611302" y="2367102"/>
+            <a:ext cx="3063606" cy="230832"/>
+          </a:xfrm>
+          <a:prstGeom prst="rect">
+            <a:avLst/>
+          </a:prstGeom>
+          <a:noFill/>
+        </p:spPr>
+        <p:txBody>
+          <a:bodyPr wrap="square" rtlCol="0">
+            <a:spAutoFit/>
+          </a:bodyPr>
+          <a:lstStyle/>
+          <a:p>
+            <a:r>
+              <a:rPr lang="en-US" sz="900" dirty="0" smtClean="0"/>
+              <a:t>Context Error when zmq resources are closed</a:t>
+            </a:r>
+            <a:endParaRPr lang="en-US" sz="1100" dirty="0"/>
+          </a:p>
+        </p:txBody>
+      </p:sp>
+      <p:cxnSp>
+        <p:nvCxnSpPr>
+          <p:cNvPr id="124" name="Elbow Connector 123"/>
+          <p:cNvCxnSpPr/>
+          <p:nvPr/>
+        </p:nvCxnSpPr>
+        <p:spPr>
+          <a:xfrm rot="16200000" flipH="1">
+            <a:off x="6476637" y="3182940"/>
+            <a:ext cx="345665" cy="12700"/>
+          </a:xfrm>
+          <a:prstGeom prst="bentConnector5">
+            <a:avLst>
+              <a:gd name="adj1" fmla="val -1725"/>
+              <a:gd name="adj2" fmla="val 3160890"/>
+              <a:gd name="adj3" fmla="val 101725"/>
+            </a:avLst>
+          </a:prstGeom>
+          <a:ln w="12700" cap="flat" cmpd="sng" algn="ctr">
+            <a:solidFill>
+              <a:srgbClr val="FF0000"/>
+            </a:solidFill>
+            <a:prstDash val="solid"/>
+            <a:round/>
+            <a:headEnd type="none"/>
+            <a:tailEnd type="triangle"/>
+          </a:ln>
+          <a:effectLst/>
+        </p:spPr>
+        <p:style>
+          <a:lnRef idx="2">
+            <a:schemeClr val="accent1"/>
+          </a:lnRef>
+          <a:fillRef idx="0">
+            <a:schemeClr val="accent1"/>
+          </a:fillRef>
+          <a:effectRef idx="1">
+            <a:schemeClr val="accent1"/>
+          </a:effectRef>
+          <a:fontRef idx="minor">
+            <a:schemeClr val="tx1"/>
+          </a:fontRef>
+        </p:style>
+      </p:cxnSp>
+      <p:sp>
+        <p:nvSpPr>
+          <p:cNvPr id="125" name="TextBox 124"/>
+          <p:cNvSpPr txBox="1"/>
+          <p:nvPr/>
+        </p:nvSpPr>
+        <p:spPr>
+          <a:xfrm>
+            <a:off x="6759213" y="3362123"/>
+            <a:ext cx="1956044" cy="230832"/>
+          </a:xfrm>
+          <a:prstGeom prst="rect">
+            <a:avLst/>
+          </a:prstGeom>
+          <a:noFill/>
+        </p:spPr>
+        <p:txBody>
+          <a:bodyPr wrap="square" rtlCol="0">
+            <a:spAutoFit/>
+          </a:bodyPr>
+          <a:lstStyle/>
+          <a:p>
+            <a:r>
+              <a:rPr lang="en-US" sz="900" dirty="0" smtClean="0"/>
+              <a:t>Disconnected so idle</a:t>
+            </a:r>
+            <a:endParaRPr lang="en-US" sz="1100" dirty="0"/>
+          </a:p>
+        </p:txBody>
+      </p:sp>
+      <p:cxnSp>
+        <p:nvCxnSpPr>
+          <p:cNvPr id="127" name="Elbow Connector 126"/>
+          <p:cNvCxnSpPr/>
+          <p:nvPr/>
+        </p:nvCxnSpPr>
+        <p:spPr>
+          <a:xfrm rot="16200000" flipH="1">
+            <a:off x="6510331" y="3871890"/>
+            <a:ext cx="345665" cy="12700"/>
+          </a:xfrm>
+          <a:prstGeom prst="bentConnector5">
+            <a:avLst>
+              <a:gd name="adj1" fmla="val -1725"/>
+              <a:gd name="adj2" fmla="val 3160890"/>
+              <a:gd name="adj3" fmla="val 101725"/>
+            </a:avLst>
+          </a:prstGeom>
+          <a:ln w="12700" cap="flat" cmpd="sng" algn="ctr">
+            <a:solidFill>
+              <a:srgbClr val="FF0000"/>
+            </a:solidFill>
+            <a:prstDash val="solid"/>
+            <a:round/>
+            <a:headEnd type="none"/>
+            <a:tailEnd type="triangle"/>
+          </a:ln>
+          <a:effectLst/>
+        </p:spPr>
+        <p:style>
+          <a:lnRef idx="2">
+            <a:schemeClr val="accent1"/>
+          </a:lnRef>
+          <a:fillRef idx="0">
+            <a:schemeClr val="accent1"/>
+          </a:fillRef>
+          <a:effectRef idx="1">
+            <a:schemeClr val="accent1"/>
+          </a:effectRef>
+          <a:fontRef idx="minor">
+            <a:schemeClr val="tx1"/>
+          </a:fontRef>
+        </p:style>
+      </p:cxnSp>
+      <p:sp>
+        <p:nvSpPr>
+          <p:cNvPr id="128" name="TextBox 127"/>
+          <p:cNvSpPr txBox="1"/>
+          <p:nvPr/>
+        </p:nvSpPr>
+        <p:spPr>
+          <a:xfrm>
+            <a:off x="6792907" y="4051073"/>
+            <a:ext cx="1956044" cy="230832"/>
+          </a:xfrm>
+          <a:prstGeom prst="rect">
+            <a:avLst/>
+          </a:prstGeom>
+          <a:noFill/>
+        </p:spPr>
+        <p:txBody>
+          <a:bodyPr wrap="square" rtlCol="0">
+            <a:spAutoFit/>
+          </a:bodyPr>
+          <a:lstStyle/>
+          <a:p>
+            <a:r>
+              <a:rPr lang="en-US" sz="900" dirty="0" smtClean="0"/>
+              <a:t>Disconnected so idle</a:t>
+            </a:r>
+            <a:endParaRPr lang="en-US" sz="1100" dirty="0"/>
+          </a:p>
+        </p:txBody>
+      </p:sp>
+      <p:cxnSp>
+        <p:nvCxnSpPr>
+          <p:cNvPr id="129" name="Elbow Connector 128"/>
+          <p:cNvCxnSpPr/>
+          <p:nvPr/>
+        </p:nvCxnSpPr>
+        <p:spPr>
+          <a:xfrm rot="16200000" flipH="1">
+            <a:off x="6533559" y="4630179"/>
+            <a:ext cx="345665" cy="12700"/>
+          </a:xfrm>
+          <a:prstGeom prst="bentConnector5">
+            <a:avLst>
+              <a:gd name="adj1" fmla="val -1725"/>
+              <a:gd name="adj2" fmla="val 3160890"/>
+              <a:gd name="adj3" fmla="val 101725"/>
+            </a:avLst>
+          </a:prstGeom>
+          <a:ln w="12700" cap="flat" cmpd="sng" algn="ctr">
+            <a:solidFill>
+              <a:srgbClr val="FF0000"/>
+            </a:solidFill>
+            <a:prstDash val="solid"/>
+            <a:round/>
+            <a:headEnd type="none"/>
+            <a:tailEnd type="triangle"/>
+          </a:ln>
+          <a:effectLst/>
+        </p:spPr>
+        <p:style>
+          <a:lnRef idx="2">
+            <a:schemeClr val="accent1"/>
+          </a:lnRef>
+          <a:fillRef idx="0">
+            <a:schemeClr val="accent1"/>
+          </a:fillRef>
+          <a:effectRef idx="1">
+            <a:schemeClr val="accent1"/>
+          </a:effectRef>
+          <a:fontRef idx="minor">
+            <a:schemeClr val="tx1"/>
+          </a:fontRef>
+        </p:style>
+      </p:cxnSp>
+      <p:sp>
+        <p:nvSpPr>
+          <p:cNvPr id="130" name="TextBox 129"/>
+          <p:cNvSpPr txBox="1"/>
+          <p:nvPr/>
+        </p:nvSpPr>
+        <p:spPr>
+          <a:xfrm>
+            <a:off x="6816135" y="4809362"/>
+            <a:ext cx="1956044" cy="230832"/>
+          </a:xfrm>
+          <a:prstGeom prst="rect">
+            <a:avLst/>
+          </a:prstGeom>
+          <a:noFill/>
+        </p:spPr>
+        <p:txBody>
+          <a:bodyPr wrap="square" rtlCol="0">
+            <a:spAutoFit/>
+          </a:bodyPr>
+          <a:lstStyle/>
+          <a:p>
+            <a:r>
+              <a:rPr lang="en-US" sz="900" dirty="0" smtClean="0"/>
+              <a:t>Disconnected so idle</a:t>
+            </a:r>
+            <a:endParaRPr lang="en-US" sz="1100" dirty="0"/>
+          </a:p>
+        </p:txBody>
+      </p:sp>
+      <p:cxnSp>
+        <p:nvCxnSpPr>
+          <p:cNvPr id="131" name="Elbow Connector 130"/>
+          <p:cNvCxnSpPr/>
+          <p:nvPr/>
+        </p:nvCxnSpPr>
+        <p:spPr>
+          <a:xfrm rot="16200000" flipH="1">
+            <a:off x="6622056" y="6300481"/>
+            <a:ext cx="345665" cy="12700"/>
+          </a:xfrm>
+          <a:prstGeom prst="bentConnector5">
+            <a:avLst>
+              <a:gd name="adj1" fmla="val -1725"/>
+              <a:gd name="adj2" fmla="val 3160890"/>
+              <a:gd name="adj3" fmla="val 101725"/>
+            </a:avLst>
+          </a:prstGeom>
+          <a:ln w="12700" cap="flat" cmpd="sng" algn="ctr">
+            <a:solidFill>
+              <a:srgbClr val="FF0000"/>
+            </a:solidFill>
+            <a:prstDash val="solid"/>
+            <a:round/>
+            <a:headEnd type="none"/>
+            <a:tailEnd type="triangle"/>
+          </a:ln>
+          <a:effectLst/>
+        </p:spPr>
+        <p:style>
+          <a:lnRef idx="2">
+            <a:schemeClr val="accent1"/>
+          </a:lnRef>
+          <a:fillRef idx="0">
+            <a:schemeClr val="accent1"/>
+          </a:fillRef>
+          <a:effectRef idx="1">
+            <a:schemeClr val="accent1"/>
+          </a:effectRef>
+          <a:fontRef idx="minor">
+            <a:schemeClr val="tx1"/>
+          </a:fontRef>
+        </p:style>
+      </p:cxnSp>
+      <p:sp>
+        <p:nvSpPr>
+          <p:cNvPr id="132" name="TextBox 131"/>
+          <p:cNvSpPr txBox="1"/>
+          <p:nvPr/>
+        </p:nvSpPr>
+        <p:spPr>
+          <a:xfrm>
+            <a:off x="6691478" y="6492875"/>
+            <a:ext cx="1956044" cy="369332"/>
+          </a:xfrm>
+          <a:prstGeom prst="rect">
+            <a:avLst/>
+          </a:prstGeom>
+          <a:noFill/>
+        </p:spPr>
+        <p:txBody>
+          <a:bodyPr wrap="square" rtlCol="0">
+            <a:spAutoFit/>
+          </a:bodyPr>
+          <a:lstStyle/>
+          <a:p>
+            <a:r>
+              <a:rPr lang="en-US" sz="900" dirty="0" smtClean="0"/>
+              <a:t>Connected so create </a:t>
+            </a:r>
+            <a:r>
+              <a:rPr lang="en-US" sz="900" dirty="0" err="1" smtClean="0"/>
+              <a:t>subSocket</a:t>
+            </a:r>
+            <a:r>
+              <a:rPr lang="en-US" sz="900" dirty="0" smtClean="0"/>
+              <a:t> and block on read</a:t>
+            </a:r>
+            <a:endParaRPr lang="en-US" sz="1100" dirty="0"/>
+          </a:p>
+        </p:txBody>
+      </p:sp>
+      <p:cxnSp>
+        <p:nvCxnSpPr>
+          <p:cNvPr id="133" name="Straight Arrow Connector 132"/>
+          <p:cNvCxnSpPr/>
+          <p:nvPr/>
+        </p:nvCxnSpPr>
+        <p:spPr>
+          <a:xfrm>
+            <a:off x="275710" y="4119569"/>
+            <a:ext cx="1274902" cy="85785"/>
+          </a:xfrm>
+          <a:prstGeom prst="straightConnector1">
+            <a:avLst/>
+          </a:prstGeom>
+          <a:ln w="12700" cap="flat" cmpd="sng" algn="ctr">
+            <a:solidFill>
+              <a:srgbClr val="FF0000"/>
+            </a:solidFill>
+            <a:prstDash val="solid"/>
+            <a:round/>
+            <a:headEnd type="none" w="med" len="med"/>
+            <a:tailEnd type="triangle"/>
+          </a:ln>
+          <a:effectLst/>
+        </p:spPr>
+        <p:style>
+          <a:lnRef idx="2">
+            <a:schemeClr val="accent1"/>
+          </a:lnRef>
+          <a:fillRef idx="0">
+            <a:schemeClr val="accent1"/>
+          </a:fillRef>
+          <a:effectRef idx="1">
+            <a:schemeClr val="accent1"/>
+          </a:effectRef>
+          <a:fontRef idx="minor">
+            <a:schemeClr val="tx1"/>
+          </a:fontRef>
+        </p:style>
+      </p:cxnSp>
+      <p:sp>
+        <p:nvSpPr>
+          <p:cNvPr id="134" name="TextBox 133"/>
+          <p:cNvSpPr txBox="1"/>
+          <p:nvPr/>
+        </p:nvSpPr>
+        <p:spPr>
+          <a:xfrm>
+            <a:off x="169646" y="3861579"/>
+            <a:ext cx="962892" cy="276999"/>
+          </a:xfrm>
+          <a:prstGeom prst="rect">
+            <a:avLst/>
+          </a:prstGeom>
+          <a:noFill/>
+        </p:spPr>
+        <p:txBody>
+          <a:bodyPr wrap="none" rtlCol="0">
+            <a:spAutoFit/>
+          </a:bodyPr>
+          <a:lstStyle/>
+          <a:p>
+            <a:r>
+              <a:rPr lang="en-US" sz="1200" dirty="0" smtClean="0"/>
+              <a:t>Telemetry In</a:t>
+            </a:r>
+            <a:endParaRPr lang="en-US" dirty="0"/>
+          </a:p>
+        </p:txBody>
+      </p:sp>
+      <p:cxnSp>
+        <p:nvCxnSpPr>
+          <p:cNvPr id="135" name="Elbow Connector 134"/>
+          <p:cNvCxnSpPr/>
+          <p:nvPr/>
+        </p:nvCxnSpPr>
+        <p:spPr>
+          <a:xfrm rot="16200000" flipH="1">
+            <a:off x="1543281" y="4382950"/>
+            <a:ext cx="345665" cy="12700"/>
+          </a:xfrm>
+          <a:prstGeom prst="bentConnector5">
+            <a:avLst>
+              <a:gd name="adj1" fmla="val -1725"/>
+              <a:gd name="adj2" fmla="val 3160890"/>
+              <a:gd name="adj3" fmla="val 101725"/>
+            </a:avLst>
+          </a:prstGeom>
+          <a:ln w="12700" cap="flat" cmpd="sng" algn="ctr">
+            <a:solidFill>
+              <a:srgbClr val="FF0000"/>
+            </a:solidFill>
+            <a:prstDash val="solid"/>
+            <a:round/>
+            <a:headEnd type="none"/>
+            <a:tailEnd type="triangle"/>
+          </a:ln>
+          <a:effectLst/>
+        </p:spPr>
+        <p:style>
+          <a:lnRef idx="2">
+            <a:schemeClr val="accent1"/>
+          </a:lnRef>
+          <a:fillRef idx="0">
+            <a:schemeClr val="accent1"/>
+          </a:fillRef>
+          <a:effectRef idx="1">
+            <a:schemeClr val="accent1"/>
+          </a:effectRef>
+          <a:fontRef idx="minor">
+            <a:schemeClr val="tx1"/>
+          </a:fontRef>
+        </p:style>
+      </p:cxnSp>
+      <p:sp>
+        <p:nvSpPr>
+          <p:cNvPr id="136" name="TextBox 135"/>
+          <p:cNvSpPr txBox="1"/>
+          <p:nvPr/>
+        </p:nvSpPr>
+        <p:spPr>
+          <a:xfrm>
+            <a:off x="2096111" y="4472810"/>
+            <a:ext cx="1584088" cy="230832"/>
+          </a:xfrm>
+          <a:prstGeom prst="rect">
+            <a:avLst/>
+          </a:prstGeom>
+          <a:noFill/>
+        </p:spPr>
+        <p:txBody>
+          <a:bodyPr wrap="none" rtlCol="0">
+            <a:spAutoFit/>
+          </a:bodyPr>
+          <a:lstStyle/>
+          <a:p>
+            <a:r>
+              <a:rPr lang="en-US" sz="900" dirty="0" smtClean="0"/>
+              <a:t>Disconnected so drop packets</a:t>
+            </a:r>
+            <a:endParaRPr lang="en-US" sz="1100" dirty="0"/>
+          </a:p>
+        </p:txBody>
+      </p:sp>
+      <p:sp>
+        <p:nvSpPr>
+          <p:cNvPr id="138" name="Rectangle 137"/>
+          <p:cNvSpPr/>
+          <p:nvPr/>
+        </p:nvSpPr>
+        <p:spPr>
+          <a:xfrm rot="5400000">
+            <a:off x="1424649" y="4323804"/>
+            <a:ext cx="393798" cy="201832"/>
+          </a:xfrm>
+          <a:prstGeom prst="rect">
+            <a:avLst/>
+          </a:prstGeom>
+          <a:solidFill>
+            <a:schemeClr val="accent1">
+              <a:lumMod val="60000"/>
+              <a:lumOff val="40000"/>
+            </a:schemeClr>
+          </a:solidFill>
+          <a:ln>
+            <a:noFill/>
+          </a:ln>
+          <a:effectLst/>
+        </p:spPr>
+        <p:style>
+          <a:lnRef idx="1">
+            <a:schemeClr val="accent1"/>
+          </a:lnRef>
+          <a:fillRef idx="3">
+            <a:schemeClr val="accent1"/>
+          </a:fillRef>
+          <a:effectRef idx="2">
+            <a:schemeClr val="accent1"/>
+          </a:effectRef>
+          <a:fontRef idx="minor">
+            <a:schemeClr val="lt1"/>
+          </a:fontRef>
+        </p:style>
+        <p:txBody>
+          <a:bodyPr rtlCol="0" anchor="ctr"/>
+          <a:lstStyle/>
+          <a:p>
+            <a:pPr algn="ctr"/>
+            <a:endParaRPr lang="en-US" sz="1000" dirty="0">
+              <a:solidFill>
+                <a:schemeClr val="tx1"/>
+              </a:solidFill>
+            </a:endParaRPr>
+          </a:p>
+        </p:txBody>
+      </p:sp>
+      <p:sp>
+        <p:nvSpPr>
+          <p:cNvPr id="139" name="TextBox 138"/>
+          <p:cNvSpPr txBox="1"/>
+          <p:nvPr/>
+        </p:nvSpPr>
+        <p:spPr>
+          <a:xfrm>
+            <a:off x="181505" y="343464"/>
+            <a:ext cx="6854762" cy="954107"/>
+          </a:xfrm>
+          <a:prstGeom prst="rect">
+            <a:avLst/>
+          </a:prstGeom>
+          <a:noFill/>
+        </p:spPr>
+        <p:txBody>
+          <a:bodyPr wrap="none" rtlCol="0">
+            <a:spAutoFit/>
+          </a:bodyPr>
+          <a:lstStyle/>
+          <a:p>
+            <a:r>
+              <a:rPr lang="en-US" sz="900" dirty="0" smtClean="0"/>
+              <a:t>Assume component starts connected to the server.</a:t>
+            </a:r>
+          </a:p>
+          <a:p>
+            <a:r>
+              <a:rPr lang="en-US" sz="900" dirty="0" smtClean="0"/>
+              <a:t>At [1] a socket error occurs and triggers a disconnect.</a:t>
+            </a:r>
+          </a:p>
+          <a:p>
+            <a:r>
+              <a:rPr lang="en-US" sz="900" dirty="0" smtClean="0"/>
+              <a:t>At [2] all zmq resources are closed. The socket in Subscriber Task must be closed as well.</a:t>
+            </a:r>
+          </a:p>
+          <a:p>
+            <a:r>
+              <a:rPr lang="en-US" sz="900" dirty="0" smtClean="0"/>
+              <a:t>			          This occurs because a </a:t>
+            </a:r>
+            <a:r>
+              <a:rPr lang="en-US" sz="900" dirty="0"/>
+              <a:t>C</a:t>
+            </a:r>
+            <a:r>
+              <a:rPr lang="en-US" sz="900" dirty="0" smtClean="0"/>
+              <a:t>ontext Error is created within the Subscriber Task.</a:t>
+            </a:r>
+          </a:p>
+          <a:p>
+            <a:r>
+              <a:rPr lang="en-US" sz="900" dirty="0" smtClean="0"/>
+              <a:t>At [3] the Subscriber Task calls transitionDisconnect because of it’s Context Error. The component is already disconnected so nothing happens.</a:t>
+            </a:r>
+          </a:p>
+          <a:p>
+            <a:r>
+              <a:rPr lang="en-US" sz="900" dirty="0" smtClean="0"/>
+              <a:t>At [4] the Subscriber Task creates a new </a:t>
+            </a:r>
+            <a:r>
+              <a:rPr lang="en-US" sz="900" dirty="0" err="1" smtClean="0"/>
+              <a:t>subSocket</a:t>
+            </a:r>
+            <a:r>
+              <a:rPr lang="en-US" sz="900" dirty="0" smtClean="0"/>
+              <a:t> because the component is connected again.</a:t>
+            </a:r>
+            <a:endParaRPr lang="en-US" sz="1100" dirty="0"/>
+          </a:p>
+        </p:txBody>
+      </p:sp>
+      <p:sp>
+        <p:nvSpPr>
+          <p:cNvPr id="140" name="TextBox 139"/>
+          <p:cNvSpPr txBox="1"/>
+          <p:nvPr/>
+        </p:nvSpPr>
+        <p:spPr>
+          <a:xfrm>
+            <a:off x="62228" y="1527033"/>
+            <a:ext cx="356188" cy="276999"/>
+          </a:xfrm>
+          <a:prstGeom prst="rect">
+            <a:avLst/>
+          </a:prstGeom>
+          <a:noFill/>
+        </p:spPr>
+        <p:txBody>
+          <a:bodyPr wrap="none" rtlCol="0">
+            <a:spAutoFit/>
+          </a:bodyPr>
+          <a:lstStyle/>
+          <a:p>
+            <a:r>
+              <a:rPr lang="en-US" sz="1200" smtClean="0"/>
+              <a:t>[1]</a:t>
+            </a:r>
+            <a:endParaRPr lang="en-US" dirty="0"/>
+          </a:p>
+        </p:txBody>
+      </p:sp>
+      <p:sp>
+        <p:nvSpPr>
+          <p:cNvPr id="141" name="TextBox 140"/>
+          <p:cNvSpPr txBox="1"/>
+          <p:nvPr/>
+        </p:nvSpPr>
+        <p:spPr>
+          <a:xfrm>
+            <a:off x="7068568" y="2012563"/>
+            <a:ext cx="1956044" cy="230832"/>
+          </a:xfrm>
+          <a:prstGeom prst="rect">
+            <a:avLst/>
+          </a:prstGeom>
+          <a:noFill/>
+        </p:spPr>
+        <p:txBody>
+          <a:bodyPr wrap="square" rtlCol="0">
+            <a:spAutoFit/>
+          </a:bodyPr>
+          <a:lstStyle/>
+          <a:p>
+            <a:r>
+              <a:rPr lang="en-US" sz="900" dirty="0" err="1" smtClean="0"/>
+              <a:t>subSocket</a:t>
+            </a:r>
+            <a:r>
+              <a:rPr lang="en-US" sz="900" dirty="0" smtClean="0"/>
+              <a:t> is blocking on a </a:t>
+            </a:r>
+            <a:r>
+              <a:rPr lang="en-US" sz="900" dirty="0" err="1" smtClean="0"/>
+              <a:t>socketread</a:t>
+            </a:r>
+            <a:endParaRPr lang="en-US" sz="1100" dirty="0"/>
+          </a:p>
+        </p:txBody>
+      </p:sp>
+      <p:sp>
+        <p:nvSpPr>
+          <p:cNvPr id="143" name="TextBox 142"/>
+          <p:cNvSpPr txBox="1"/>
+          <p:nvPr/>
+        </p:nvSpPr>
+        <p:spPr>
+          <a:xfrm>
+            <a:off x="5160552" y="1919749"/>
+            <a:ext cx="356188" cy="276999"/>
+          </a:xfrm>
+          <a:prstGeom prst="rect">
+            <a:avLst/>
+          </a:prstGeom>
+          <a:noFill/>
+        </p:spPr>
+        <p:txBody>
+          <a:bodyPr wrap="none" rtlCol="0">
+            <a:spAutoFit/>
+          </a:bodyPr>
+          <a:lstStyle/>
+          <a:p>
+            <a:r>
+              <a:rPr lang="en-US" sz="1200" smtClean="0"/>
+              <a:t>[2]</a:t>
+            </a:r>
+            <a:endParaRPr lang="en-US" dirty="0"/>
+          </a:p>
+        </p:txBody>
+      </p:sp>
+      <p:sp>
+        <p:nvSpPr>
+          <p:cNvPr id="144" name="TextBox 143"/>
+          <p:cNvSpPr txBox="1"/>
+          <p:nvPr/>
+        </p:nvSpPr>
+        <p:spPr>
+          <a:xfrm>
+            <a:off x="5991021" y="2467309"/>
+            <a:ext cx="356188" cy="276999"/>
+          </a:xfrm>
+          <a:prstGeom prst="rect">
+            <a:avLst/>
+          </a:prstGeom>
+          <a:noFill/>
+        </p:spPr>
+        <p:txBody>
+          <a:bodyPr wrap="none" rtlCol="0">
+            <a:spAutoFit/>
+          </a:bodyPr>
+          <a:lstStyle/>
+          <a:p>
+            <a:r>
+              <a:rPr lang="en-US" sz="1200" dirty="0" smtClean="0"/>
+              <a:t>[3]</a:t>
+            </a:r>
+            <a:endParaRPr lang="en-US" dirty="0"/>
+          </a:p>
+        </p:txBody>
+      </p:sp>
+      <p:sp>
+        <p:nvSpPr>
+          <p:cNvPr id="145" name="TextBox 144"/>
+          <p:cNvSpPr txBox="1"/>
+          <p:nvPr/>
+        </p:nvSpPr>
+        <p:spPr>
+          <a:xfrm>
+            <a:off x="7246879" y="5935542"/>
+            <a:ext cx="356188" cy="276999"/>
+          </a:xfrm>
+          <a:prstGeom prst="rect">
+            <a:avLst/>
+          </a:prstGeom>
+          <a:noFill/>
+        </p:spPr>
+        <p:txBody>
+          <a:bodyPr wrap="none" rtlCol="0">
+            <a:spAutoFit/>
+          </a:bodyPr>
+          <a:lstStyle/>
+          <a:p>
+            <a:r>
+              <a:rPr lang="en-US" sz="1200" dirty="0" smtClean="0"/>
+              <a:t>[4]</a:t>
+            </a:r>
+            <a:endParaRPr lang="en-US" dirty="0"/>
           </a:p>
         </p:txBody>
       </p:sp>
     </p:spTree>
     <p:extLst>
       <p:ext uri="{BB962C8B-B14F-4D97-AF65-F5344CB8AC3E}">
-        <p14:creationId xmlns:p14="http://schemas.microsoft.com/office/powerpoint/2010/main" val="148158468"/>
+        <p14:creationId xmlns:p14="http://schemas.microsoft.com/office/powerpoint/2010/main" val="1489143022"/>
       </p:ext>
     </p:extLst>
   </p:cSld>
   <p:clrMapOvr>
     <a:masterClrMapping/>
   </p:clrMapOvr>
-  <p:timing>
-    <p:tnLst>
-      <p:par>
-        <p:cTn id="1" dur="indefinite" restart="never" nodeType="tmRoot"/>
-      </p:par>
-    </p:tnLst>
-  </p:timing>
 </p:sld>
 </file>
 
@@ -21249,7 +22983,7 @@
         </p:nvSpPr>
         <p:spPr>
           <a:xfrm>
-            <a:off x="301611" y="5401890"/>
+            <a:off x="301611" y="4419365"/>
             <a:ext cx="2173045" cy="890736"/>
           </a:xfrm>
           <a:prstGeom prst="rect">
@@ -21309,7 +23043,7 @@
           <a:p>
             <a:r>
               <a:rPr lang="en-US" dirty="0" smtClean="0"/>
-              <a:t>Zmq Radio Component Testing</a:t>
+              <a:t>Zmq Radio Component Implementation</a:t>
             </a:r>
             <a:endParaRPr lang="en-US" dirty="0"/>
           </a:p>
@@ -21843,13 +23577,7 @@
           <a:p>
             <a:r>
               <a:rPr lang="en-US" sz="2000" dirty="0" smtClean="0"/>
-              <a:t>One unit test to verify state changes</a:t>
-            </a:r>
-          </a:p>
-          <a:p>
-            <a:r>
-              <a:rPr lang="en-US" sz="2000" dirty="0" smtClean="0"/>
-              <a:t>Functional end-to-end inspection</a:t>
+              <a:t>Main work for the Zmq Radio Component</a:t>
             </a:r>
             <a:endParaRPr lang="en-US" sz="2000" dirty="0"/>
           </a:p>
@@ -21858,7 +23586,7 @@
     </p:spTree>
     <p:extLst>
       <p:ext uri="{BB962C8B-B14F-4D97-AF65-F5344CB8AC3E}">
-        <p14:creationId xmlns:p14="http://schemas.microsoft.com/office/powerpoint/2010/main" val="1508911582"/>
+        <p14:creationId xmlns:p14="http://schemas.microsoft.com/office/powerpoint/2010/main" val="148158468"/>
       </p:ext>
     </p:extLst>
   </p:cSld>
@@ -22316,6 +24044,657 @@
       </p:grpSpPr>
       <p:sp>
         <p:nvSpPr>
+          <p:cNvPr id="38" name="Rectangle 37"/>
+          <p:cNvSpPr/>
+          <p:nvPr/>
+        </p:nvSpPr>
+        <p:spPr>
+          <a:xfrm>
+            <a:off x="301611" y="5401890"/>
+            <a:ext cx="2173045" cy="890736"/>
+          </a:xfrm>
+          <a:prstGeom prst="rect">
+            <a:avLst/>
+          </a:prstGeom>
+          <a:solidFill>
+            <a:srgbClr val="00B050"/>
+          </a:solidFill>
+          <a:ln>
+            <a:noFill/>
+          </a:ln>
+          <a:effectLst>
+            <a:glow rad="101600">
+              <a:srgbClr val="00B050">
+                <a:alpha val="40000"/>
+              </a:srgbClr>
+            </a:glow>
+          </a:effectLst>
+        </p:spPr>
+        <p:style>
+          <a:lnRef idx="1">
+            <a:schemeClr val="accent1"/>
+          </a:lnRef>
+          <a:fillRef idx="3">
+            <a:schemeClr val="accent1"/>
+          </a:fillRef>
+          <a:effectRef idx="2">
+            <a:schemeClr val="accent1"/>
+          </a:effectRef>
+          <a:fontRef idx="minor">
+            <a:schemeClr val="lt1"/>
+          </a:fontRef>
+        </p:style>
+        <p:txBody>
+          <a:bodyPr rtlCol="0" anchor="ctr"/>
+          <a:lstStyle/>
+          <a:p>
+            <a:pPr algn="ctr"/>
+            <a:endParaRPr lang="en-US"/>
+          </a:p>
+        </p:txBody>
+      </p:sp>
+      <p:sp>
+        <p:nvSpPr>
+          <p:cNvPr id="2" name="Text Placeholder 1"/>
+          <p:cNvSpPr>
+            <a:spLocks noGrp="1"/>
+          </p:cNvSpPr>
+          <p:nvPr>
+            <p:ph type="body" sz="quarter" idx="16"/>
+          </p:nvPr>
+        </p:nvSpPr>
+        <p:spPr/>
+        <p:txBody>
+          <a:bodyPr/>
+          <a:lstStyle/>
+          <a:p>
+            <a:r>
+              <a:rPr lang="en-US" dirty="0" smtClean="0"/>
+              <a:t>Zmq Radio Component Testing</a:t>
+            </a:r>
+            <a:endParaRPr lang="en-US" dirty="0"/>
+          </a:p>
+        </p:txBody>
+      </p:sp>
+      <p:sp>
+        <p:nvSpPr>
+          <p:cNvPr id="3" name="Title 2"/>
+          <p:cNvSpPr>
+            <a:spLocks noGrp="1"/>
+          </p:cNvSpPr>
+          <p:nvPr>
+            <p:ph type="ctrTitle"/>
+          </p:nvPr>
+        </p:nvSpPr>
+        <p:spPr/>
+        <p:txBody>
+          <a:bodyPr/>
+          <a:lstStyle/>
+          <a:p>
+            <a:r>
+              <a:rPr lang="en-US" dirty="0" smtClean="0"/>
+              <a:t>Design Process</a:t>
+            </a:r>
+            <a:endParaRPr lang="en-US" dirty="0"/>
+          </a:p>
+        </p:txBody>
+      </p:sp>
+      <p:sp>
+        <p:nvSpPr>
+          <p:cNvPr id="5" name="Date Placeholder 4"/>
+          <p:cNvSpPr>
+            <a:spLocks noGrp="1"/>
+          </p:cNvSpPr>
+          <p:nvPr>
+            <p:ph type="dt" sz="half" idx="18"/>
+          </p:nvPr>
+        </p:nvSpPr>
+        <p:spPr/>
+        <p:txBody>
+          <a:bodyPr/>
+          <a:lstStyle/>
+          <a:p>
+            <a:r>
+              <a:rPr lang="en-US" dirty="0" smtClean="0"/>
+              <a:t>9/1/17</a:t>
+            </a:r>
+            <a:endParaRPr lang="en-US" dirty="0"/>
+          </a:p>
+        </p:txBody>
+      </p:sp>
+      <p:sp>
+        <p:nvSpPr>
+          <p:cNvPr id="6" name="Footer Placeholder 5"/>
+          <p:cNvSpPr>
+            <a:spLocks noGrp="1"/>
+          </p:cNvSpPr>
+          <p:nvPr>
+            <p:ph type="ftr" sz="quarter" idx="19"/>
+          </p:nvPr>
+        </p:nvSpPr>
+        <p:spPr/>
+        <p:txBody>
+          <a:bodyPr/>
+          <a:lstStyle/>
+          <a:p>
+            <a:endParaRPr lang="en-US" dirty="0"/>
+          </a:p>
+        </p:txBody>
+      </p:sp>
+      <p:sp>
+        <p:nvSpPr>
+          <p:cNvPr id="7" name="Slide Number Placeholder 6"/>
+          <p:cNvSpPr>
+            <a:spLocks noGrp="1"/>
+          </p:cNvSpPr>
+          <p:nvPr>
+            <p:ph type="sldNum" sz="quarter" idx="20"/>
+          </p:nvPr>
+        </p:nvSpPr>
+        <p:spPr/>
+        <p:txBody>
+          <a:bodyPr/>
+          <a:lstStyle/>
+          <a:p>
+            <a:fld id="{F1E51A9F-9D40-144B-9666-6B30B75E8C1B}" type="slidenum">
+              <a:rPr lang="en-US" smtClean="0"/>
+              <a:pPr/>
+              <a:t>20</a:t>
+            </a:fld>
+            <a:endParaRPr lang="en-US"/>
+          </a:p>
+        </p:txBody>
+      </p:sp>
+      <p:sp>
+        <p:nvSpPr>
+          <p:cNvPr id="9" name="Rectangle 8"/>
+          <p:cNvSpPr/>
+          <p:nvPr/>
+        </p:nvSpPr>
+        <p:spPr>
+          <a:xfrm>
+            <a:off x="474135" y="1722092"/>
+            <a:ext cx="1828001" cy="547768"/>
+          </a:xfrm>
+          <a:prstGeom prst="rect">
+            <a:avLst/>
+          </a:prstGeom>
+          <a:solidFill>
+            <a:srgbClr val="BA0C2F"/>
+          </a:solidFill>
+          <a:ln>
+            <a:noFill/>
+          </a:ln>
+          <a:effectLst/>
+        </p:spPr>
+        <p:style>
+          <a:lnRef idx="1">
+            <a:schemeClr val="accent1"/>
+          </a:lnRef>
+          <a:fillRef idx="3">
+            <a:schemeClr val="accent1"/>
+          </a:fillRef>
+          <a:effectRef idx="2">
+            <a:schemeClr val="accent1"/>
+          </a:effectRef>
+          <a:fontRef idx="minor">
+            <a:schemeClr val="lt1"/>
+          </a:fontRef>
+        </p:style>
+        <p:txBody>
+          <a:bodyPr rtlCol="0" anchor="ctr"/>
+          <a:lstStyle/>
+          <a:p>
+            <a:pPr algn="ctr"/>
+            <a:r>
+              <a:rPr lang="en-US" dirty="0" smtClean="0"/>
+              <a:t>Requirements</a:t>
+            </a:r>
+            <a:endParaRPr lang="en-US" dirty="0"/>
+          </a:p>
+        </p:txBody>
+      </p:sp>
+      <p:sp>
+        <p:nvSpPr>
+          <p:cNvPr id="10" name="Rectangle 9"/>
+          <p:cNvSpPr/>
+          <p:nvPr/>
+        </p:nvSpPr>
+        <p:spPr>
+          <a:xfrm>
+            <a:off x="474134" y="2631331"/>
+            <a:ext cx="1828001" cy="547768"/>
+          </a:xfrm>
+          <a:prstGeom prst="rect">
+            <a:avLst/>
+          </a:prstGeom>
+          <a:solidFill>
+            <a:srgbClr val="BA0C2F"/>
+          </a:solidFill>
+          <a:ln>
+            <a:noFill/>
+          </a:ln>
+          <a:effectLst/>
+        </p:spPr>
+        <p:style>
+          <a:lnRef idx="1">
+            <a:schemeClr val="accent1"/>
+          </a:lnRef>
+          <a:fillRef idx="3">
+            <a:schemeClr val="accent1"/>
+          </a:fillRef>
+          <a:effectRef idx="2">
+            <a:schemeClr val="accent1"/>
+          </a:effectRef>
+          <a:fontRef idx="minor">
+            <a:schemeClr val="lt1"/>
+          </a:fontRef>
+        </p:style>
+        <p:txBody>
+          <a:bodyPr rtlCol="0" anchor="ctr"/>
+          <a:lstStyle/>
+          <a:p>
+            <a:pPr algn="ctr"/>
+            <a:r>
+              <a:rPr lang="en-US" smtClean="0"/>
+              <a:t>Analysis</a:t>
+            </a:r>
+            <a:endParaRPr lang="en-US" dirty="0"/>
+          </a:p>
+        </p:txBody>
+      </p:sp>
+      <p:sp>
+        <p:nvSpPr>
+          <p:cNvPr id="11" name="Rectangle 10"/>
+          <p:cNvSpPr/>
+          <p:nvPr/>
+        </p:nvSpPr>
+        <p:spPr>
+          <a:xfrm>
+            <a:off x="474134" y="3540570"/>
+            <a:ext cx="1828001" cy="547768"/>
+          </a:xfrm>
+          <a:prstGeom prst="rect">
+            <a:avLst/>
+          </a:prstGeom>
+          <a:solidFill>
+            <a:srgbClr val="BA0C2F"/>
+          </a:solidFill>
+          <a:ln>
+            <a:noFill/>
+          </a:ln>
+          <a:effectLst/>
+        </p:spPr>
+        <p:style>
+          <a:lnRef idx="1">
+            <a:schemeClr val="accent1"/>
+          </a:lnRef>
+          <a:fillRef idx="3">
+            <a:schemeClr val="accent1"/>
+          </a:fillRef>
+          <a:effectRef idx="2">
+            <a:schemeClr val="accent1"/>
+          </a:effectRef>
+          <a:fontRef idx="minor">
+            <a:schemeClr val="lt1"/>
+          </a:fontRef>
+        </p:style>
+        <p:txBody>
+          <a:bodyPr rtlCol="0" anchor="ctr"/>
+          <a:lstStyle/>
+          <a:p>
+            <a:pPr algn="ctr"/>
+            <a:r>
+              <a:rPr lang="en-US" dirty="0" smtClean="0"/>
+              <a:t>Design</a:t>
+            </a:r>
+            <a:endParaRPr lang="en-US" dirty="0"/>
+          </a:p>
+        </p:txBody>
+      </p:sp>
+      <p:sp>
+        <p:nvSpPr>
+          <p:cNvPr id="12" name="Rectangle 11"/>
+          <p:cNvSpPr/>
+          <p:nvPr/>
+        </p:nvSpPr>
+        <p:spPr>
+          <a:xfrm>
+            <a:off x="474134" y="4590849"/>
+            <a:ext cx="1828001" cy="547768"/>
+          </a:xfrm>
+          <a:prstGeom prst="rect">
+            <a:avLst/>
+          </a:prstGeom>
+          <a:solidFill>
+            <a:srgbClr val="BA0C2F"/>
+          </a:solidFill>
+          <a:ln>
+            <a:noFill/>
+          </a:ln>
+          <a:effectLst/>
+        </p:spPr>
+        <p:style>
+          <a:lnRef idx="1">
+            <a:schemeClr val="accent1"/>
+          </a:lnRef>
+          <a:fillRef idx="3">
+            <a:schemeClr val="accent1"/>
+          </a:fillRef>
+          <a:effectRef idx="2">
+            <a:schemeClr val="accent1"/>
+          </a:effectRef>
+          <a:fontRef idx="minor">
+            <a:schemeClr val="lt1"/>
+          </a:fontRef>
+        </p:style>
+        <p:txBody>
+          <a:bodyPr rtlCol="0" anchor="ctr"/>
+          <a:lstStyle/>
+          <a:p>
+            <a:pPr algn="ctr"/>
+            <a:r>
+              <a:rPr lang="en-US" smtClean="0"/>
+              <a:t>Implementation</a:t>
+            </a:r>
+            <a:endParaRPr lang="en-US" dirty="0"/>
+          </a:p>
+        </p:txBody>
+      </p:sp>
+      <p:sp>
+        <p:nvSpPr>
+          <p:cNvPr id="13" name="Rectangle 12"/>
+          <p:cNvSpPr/>
+          <p:nvPr/>
+        </p:nvSpPr>
+        <p:spPr>
+          <a:xfrm>
+            <a:off x="474134" y="5590036"/>
+            <a:ext cx="1828001" cy="547768"/>
+          </a:xfrm>
+          <a:prstGeom prst="rect">
+            <a:avLst/>
+          </a:prstGeom>
+          <a:solidFill>
+            <a:srgbClr val="BA0C2F"/>
+          </a:solidFill>
+          <a:ln>
+            <a:noFill/>
+          </a:ln>
+          <a:effectLst/>
+        </p:spPr>
+        <p:style>
+          <a:lnRef idx="1">
+            <a:schemeClr val="accent1"/>
+          </a:lnRef>
+          <a:fillRef idx="3">
+            <a:schemeClr val="accent1"/>
+          </a:fillRef>
+          <a:effectRef idx="2">
+            <a:schemeClr val="accent1"/>
+          </a:effectRef>
+          <a:fontRef idx="minor">
+            <a:schemeClr val="lt1"/>
+          </a:fontRef>
+        </p:style>
+        <p:txBody>
+          <a:bodyPr rtlCol="0" anchor="ctr"/>
+          <a:lstStyle/>
+          <a:p>
+            <a:pPr algn="ctr"/>
+            <a:r>
+              <a:rPr lang="en-US" dirty="0" smtClean="0"/>
+              <a:t>Test</a:t>
+            </a:r>
+            <a:endParaRPr lang="en-US" dirty="0"/>
+          </a:p>
+        </p:txBody>
+      </p:sp>
+      <p:cxnSp>
+        <p:nvCxnSpPr>
+          <p:cNvPr id="17" name="Straight Arrow Connector 16"/>
+          <p:cNvCxnSpPr>
+            <a:stCxn id="9" idx="2"/>
+            <a:endCxn id="10" idx="0"/>
+          </p:cNvCxnSpPr>
+          <p:nvPr/>
+        </p:nvCxnSpPr>
+        <p:spPr>
+          <a:xfrm flipH="1">
+            <a:off x="1388135" y="2269860"/>
+            <a:ext cx="1" cy="361471"/>
+          </a:xfrm>
+          <a:prstGeom prst="straightConnector1">
+            <a:avLst/>
+          </a:prstGeom>
+          <a:ln w="12700" cap="flat" cmpd="sng" algn="ctr">
+            <a:solidFill>
+              <a:schemeClr val="tx1"/>
+            </a:solidFill>
+            <a:prstDash val="solid"/>
+            <a:round/>
+            <a:headEnd type="none" w="med" len="med"/>
+            <a:tailEnd type="triangle"/>
+          </a:ln>
+          <a:effectLst/>
+        </p:spPr>
+        <p:style>
+          <a:lnRef idx="2">
+            <a:schemeClr val="accent1"/>
+          </a:lnRef>
+          <a:fillRef idx="0">
+            <a:schemeClr val="accent1"/>
+          </a:fillRef>
+          <a:effectRef idx="1">
+            <a:schemeClr val="accent1"/>
+          </a:effectRef>
+          <a:fontRef idx="minor">
+            <a:schemeClr val="tx1"/>
+          </a:fontRef>
+        </p:style>
+      </p:cxnSp>
+      <p:cxnSp>
+        <p:nvCxnSpPr>
+          <p:cNvPr id="19" name="Straight Arrow Connector 18"/>
+          <p:cNvCxnSpPr>
+            <a:stCxn id="10" idx="2"/>
+            <a:endCxn id="11" idx="0"/>
+          </p:cNvCxnSpPr>
+          <p:nvPr/>
+        </p:nvCxnSpPr>
+        <p:spPr>
+          <a:xfrm>
+            <a:off x="1388135" y="3179099"/>
+            <a:ext cx="0" cy="361471"/>
+          </a:xfrm>
+          <a:prstGeom prst="straightConnector1">
+            <a:avLst/>
+          </a:prstGeom>
+          <a:ln w="12700" cap="flat" cmpd="sng" algn="ctr">
+            <a:solidFill>
+              <a:schemeClr val="tx1"/>
+            </a:solidFill>
+            <a:prstDash val="solid"/>
+            <a:round/>
+            <a:headEnd type="none" w="med" len="med"/>
+            <a:tailEnd type="triangle"/>
+          </a:ln>
+          <a:effectLst/>
+        </p:spPr>
+        <p:style>
+          <a:lnRef idx="2">
+            <a:schemeClr val="accent1"/>
+          </a:lnRef>
+          <a:fillRef idx="0">
+            <a:schemeClr val="accent1"/>
+          </a:fillRef>
+          <a:effectRef idx="1">
+            <a:schemeClr val="accent1"/>
+          </a:effectRef>
+          <a:fontRef idx="minor">
+            <a:schemeClr val="tx1"/>
+          </a:fontRef>
+        </p:style>
+      </p:cxnSp>
+      <p:cxnSp>
+        <p:nvCxnSpPr>
+          <p:cNvPr id="21" name="Straight Arrow Connector 20"/>
+          <p:cNvCxnSpPr>
+            <a:stCxn id="11" idx="2"/>
+            <a:endCxn id="12" idx="0"/>
+          </p:cNvCxnSpPr>
+          <p:nvPr/>
+        </p:nvCxnSpPr>
+        <p:spPr>
+          <a:xfrm>
+            <a:off x="1388135" y="4088338"/>
+            <a:ext cx="0" cy="502511"/>
+          </a:xfrm>
+          <a:prstGeom prst="straightConnector1">
+            <a:avLst/>
+          </a:prstGeom>
+          <a:ln w="12700" cap="flat" cmpd="sng" algn="ctr">
+            <a:solidFill>
+              <a:schemeClr val="tx1"/>
+            </a:solidFill>
+            <a:prstDash val="solid"/>
+            <a:round/>
+            <a:headEnd type="none" w="med" len="med"/>
+            <a:tailEnd type="triangle"/>
+          </a:ln>
+          <a:effectLst/>
+        </p:spPr>
+        <p:style>
+          <a:lnRef idx="2">
+            <a:schemeClr val="accent1"/>
+          </a:lnRef>
+          <a:fillRef idx="0">
+            <a:schemeClr val="accent1"/>
+          </a:fillRef>
+          <a:effectRef idx="1">
+            <a:schemeClr val="accent1"/>
+          </a:effectRef>
+          <a:fontRef idx="minor">
+            <a:schemeClr val="tx1"/>
+          </a:fontRef>
+        </p:style>
+      </p:cxnSp>
+      <p:cxnSp>
+        <p:nvCxnSpPr>
+          <p:cNvPr id="23" name="Straight Arrow Connector 22"/>
+          <p:cNvCxnSpPr>
+            <a:stCxn id="12" idx="2"/>
+            <a:endCxn id="13" idx="0"/>
+          </p:cNvCxnSpPr>
+          <p:nvPr/>
+        </p:nvCxnSpPr>
+        <p:spPr>
+          <a:xfrm>
+            <a:off x="1388135" y="5138617"/>
+            <a:ext cx="0" cy="451419"/>
+          </a:xfrm>
+          <a:prstGeom prst="straightConnector1">
+            <a:avLst/>
+          </a:prstGeom>
+          <a:ln w="12700" cap="flat" cmpd="sng" algn="ctr">
+            <a:solidFill>
+              <a:schemeClr val="tx1"/>
+            </a:solidFill>
+            <a:prstDash val="solid"/>
+            <a:round/>
+            <a:headEnd type="none" w="med" len="med"/>
+            <a:tailEnd type="triangle"/>
+          </a:ln>
+          <a:effectLst/>
+        </p:spPr>
+        <p:style>
+          <a:lnRef idx="2">
+            <a:schemeClr val="accent1"/>
+          </a:lnRef>
+          <a:fillRef idx="0">
+            <a:schemeClr val="accent1"/>
+          </a:fillRef>
+          <a:effectRef idx="1">
+            <a:schemeClr val="accent1"/>
+          </a:effectRef>
+          <a:fontRef idx="minor">
+            <a:schemeClr val="tx1"/>
+          </a:fontRef>
+        </p:style>
+      </p:cxnSp>
+      <p:sp>
+        <p:nvSpPr>
+          <p:cNvPr id="4" name="Text Placeholder 3"/>
+          <p:cNvSpPr>
+            <a:spLocks noGrp="1"/>
+          </p:cNvSpPr>
+          <p:nvPr>
+            <p:ph type="body" sz="quarter" idx="17"/>
+          </p:nvPr>
+        </p:nvSpPr>
+        <p:spPr>
+          <a:xfrm>
+            <a:off x="2647179" y="1722092"/>
+            <a:ext cx="6166836" cy="4415712"/>
+          </a:xfrm>
+        </p:spPr>
+        <p:txBody>
+          <a:bodyPr/>
+          <a:lstStyle/>
+          <a:p>
+            <a:r>
+              <a:rPr lang="en-US" sz="2000" dirty="0" smtClean="0"/>
+              <a:t>One unit test to verify state changes</a:t>
+            </a:r>
+          </a:p>
+          <a:p>
+            <a:r>
+              <a:rPr lang="en-US" sz="2000" dirty="0" smtClean="0"/>
+              <a:t>Functional end-to-end inspection</a:t>
+            </a:r>
+            <a:endParaRPr lang="en-US" sz="2000" dirty="0"/>
+          </a:p>
+        </p:txBody>
+      </p:sp>
+    </p:spTree>
+    <p:extLst>
+      <p:ext uri="{BB962C8B-B14F-4D97-AF65-F5344CB8AC3E}">
+        <p14:creationId xmlns:p14="http://schemas.microsoft.com/office/powerpoint/2010/main" val="1508911582"/>
+      </p:ext>
+    </p:extLst>
+  </p:cSld>
+  <p:clrMapOvr>
+    <a:masterClrMapping/>
+  </p:clrMapOvr>
+  <p:timing>
+    <p:tnLst>
+      <p:par>
+        <p:cTn id="1" dur="indefinite" restart="never" nodeType="tmRoot"/>
+      </p:par>
+    </p:tnLst>
+  </p:timing>
+</p:sld>
+</file>
+
+<file path=ppt/slides/slide21.xml><?xml version="1.0" encoding="utf-8"?>
+<p:sld xmlns:a="http://schemas.openxmlformats.org/drawingml/2006/main" xmlns:r="http://schemas.openxmlformats.org/officeDocument/2006/relationships" xmlns:p="http://schemas.openxmlformats.org/presentationml/2006/main">
+  <p:cSld>
+    <p:spTree>
+      <p:nvGrpSpPr>
+        <p:cNvPr id="1" name=""/>
+        <p:cNvGrpSpPr/>
+        <p:nvPr/>
+      </p:nvGrpSpPr>
+      <p:grpSpPr>
+        <a:xfrm>
+          <a:off x="0" y="0"/>
+          <a:ext cx="0" cy="0"/>
+          <a:chOff x="0" y="0"/>
+          <a:chExt cx="0" cy="0"/>
+        </a:xfrm>
+      </p:grpSpPr>
+      <p:sp>
+        <p:nvSpPr>
           <p:cNvPr id="86" name="Rectangle 85"/>
           <p:cNvSpPr/>
           <p:nvPr/>
@@ -22473,7 +24852,7 @@
             <a:fld id="{F1E51A9F-9D40-144B-9666-6B30B75E8C1B}" type="slidenum">
               <a:rPr lang="en-US" smtClean="0"/>
               <a:pPr/>
-              <a:t>20</a:t>
+              <a:t>21</a:t>
             </a:fld>
             <a:endParaRPr lang="en-US"/>
           </a:p>
@@ -24208,7 +26587,7 @@
 </p:sld>
 </file>
 
-<file path=ppt/slides/slide21.xml><?xml version="1.0" encoding="utf-8"?>
+<file path=ppt/slides/slide22.xml><?xml version="1.0" encoding="utf-8"?>
 <p:sld xmlns:a="http://schemas.openxmlformats.org/drawingml/2006/main" xmlns:r="http://schemas.openxmlformats.org/officeDocument/2006/relationships" xmlns:p="http://schemas.openxmlformats.org/presentationml/2006/main">
   <p:cSld>
     <p:spTree>
@@ -24340,7 +26719,7 @@
               <a:pPr>
                 <a:defRPr/>
               </a:pPr>
-              <a:t>21</a:t>
+              <a:t>22</a:t>
             </a:fld>
             <a:endParaRPr lang="en-US" sz="700" dirty="0"/>
           </a:p>
@@ -24366,7 +26745,7 @@
 </p:sld>
 </file>
 
-<file path=ppt/slides/slide22.xml><?xml version="1.0" encoding="utf-8"?>
+<file path=ppt/slides/slide23.xml><?xml version="1.0" encoding="utf-8"?>
 <p:sld xmlns:a="http://schemas.openxmlformats.org/drawingml/2006/main" xmlns:r="http://schemas.openxmlformats.org/officeDocument/2006/relationships" xmlns:p="http://schemas.openxmlformats.org/presentationml/2006/main">
   <p:cSld>
     <p:spTree>
@@ -24562,7 +26941,7 @@
               <a:pPr>
                 <a:defRPr/>
               </a:pPr>
-              <a:t>22</a:t>
+              <a:t>23</a:t>
             </a:fld>
             <a:endParaRPr lang="en-US" sz="700" dirty="0"/>
           </a:p>
@@ -24581,7 +26960,7 @@
 </p:sld>
 </file>
 
-<file path=ppt/slides/slide23.xml><?xml version="1.0" encoding="utf-8"?>
+<file path=ppt/slides/slide24.xml><?xml version="1.0" encoding="utf-8"?>
 <p:sld xmlns:a="http://schemas.openxmlformats.org/drawingml/2006/main" xmlns:r="http://schemas.openxmlformats.org/officeDocument/2006/relationships" xmlns:p="http://schemas.openxmlformats.org/presentationml/2006/main">
   <p:cSld>
     <p:spTree>
@@ -28684,15 +31063,7 @@
                   <a:schemeClr val="tx1"/>
                 </a:solidFill>
               </a:rPr>
-              <a:t> </a:t>
-            </a:r>
-            <a:r>
-              <a:rPr lang="en-US" sz="1000" dirty="0" smtClean="0">
-                <a:solidFill>
-                  <a:schemeClr val="tx1"/>
-                </a:solidFill>
-              </a:rPr>
-              <a:t>Thread</a:t>
+              <a:t> Thread</a:t>
             </a:r>
             <a:endParaRPr lang="en-US" sz="1000" dirty="0">
               <a:solidFill>
@@ -28752,15 +31123,7 @@
                   <a:schemeClr val="tx1"/>
                 </a:solidFill>
               </a:rPr>
-              <a:t>n Flight</a:t>
-            </a:r>
-            <a:r>
-              <a:rPr lang="en-US" sz="1000" dirty="0" smtClean="0">
-                <a:solidFill>
-                  <a:schemeClr val="tx1"/>
-                </a:solidFill>
-              </a:rPr>
-              <a:t> </a:t>
+              <a:t>n Flight </a:t>
             </a:r>
             <a:r>
               <a:rPr lang="en-US" sz="1000" dirty="0" err="1" smtClean="0">
@@ -28844,23 +31207,7 @@
                   <a:schemeClr val="tx1"/>
                 </a:solidFill>
               </a:rPr>
-              <a:t> Ground </a:t>
-            </a:r>
-            <a:r>
-              <a:rPr lang="en-US" sz="1000" dirty="0" smtClean="0">
-                <a:solidFill>
-                  <a:schemeClr val="tx1"/>
-                </a:solidFill>
-              </a:rPr>
-              <a:t>Publisher </a:t>
-            </a:r>
-            <a:r>
-              <a:rPr lang="en-US" sz="1000" dirty="0" smtClean="0">
-                <a:solidFill>
-                  <a:schemeClr val="tx1"/>
-                </a:solidFill>
-              </a:rPr>
-              <a:t>Threads</a:t>
+              <a:t> Ground Publisher Threads</a:t>
             </a:r>
             <a:endParaRPr lang="en-US" sz="1000" dirty="0">
               <a:solidFill>
@@ -31362,11 +33709,6 @@
               </a:rPr>
               <a:t>D</a:t>
             </a:r>
-            <a:endParaRPr lang="en-US" sz="1400" dirty="0">
-              <a:solidFill>
-                <a:schemeClr val="tx1"/>
-              </a:solidFill>
-            </a:endParaRPr>
           </a:p>
         </p:txBody>
       </p:sp>
@@ -31422,11 +33764,6 @@
               </a:rPr>
               <a:t>D</a:t>
             </a:r>
-            <a:endParaRPr lang="en-US" sz="1400" dirty="0">
-              <a:solidFill>
-                <a:schemeClr val="tx1"/>
-              </a:solidFill>
-            </a:endParaRPr>
           </a:p>
         </p:txBody>
       </p:sp>
@@ -31482,11 +33819,6 @@
               </a:rPr>
               <a:t>D</a:t>
             </a:r>
-            <a:endParaRPr lang="en-US" sz="1400" dirty="0">
-              <a:solidFill>
-                <a:schemeClr val="tx1"/>
-              </a:solidFill>
-            </a:endParaRPr>
           </a:p>
         </p:txBody>
       </p:sp>
@@ -31542,11 +33874,6 @@
               </a:rPr>
               <a:t>D</a:t>
             </a:r>
-            <a:endParaRPr lang="en-US" sz="1400" dirty="0">
-              <a:solidFill>
-                <a:schemeClr val="tx1"/>
-              </a:solidFill>
-            </a:endParaRPr>
           </a:p>
         </p:txBody>
       </p:sp>
@@ -31616,7 +33943,6 @@
               <a:rPr lang="en-US" sz="1100" dirty="0" smtClean="0"/>
               <a:t>Arbitrary Protocol</a:t>
             </a:r>
-            <a:endParaRPr lang="en-US" sz="1100" dirty="0" smtClean="0"/>
           </a:p>
           <a:p>
             <a:endParaRPr lang="en-US" sz="1100" dirty="0" smtClean="0"/>
@@ -32057,7 +34383,6 @@
               <a:rPr lang="en-US" sz="1100" dirty="0" smtClean="0"/>
               <a:t>One thread per connection.</a:t>
             </a:r>
-            <a:endParaRPr lang="en-US" sz="1100" dirty="0" smtClean="0"/>
           </a:p>
           <a:p>
             <a:endParaRPr lang="en-US" sz="1100" dirty="0" smtClean="0"/>

</xml_diff>